<commit_message>
amend figures; add figures to presentation
</commit_message>
<xml_diff>
--- a/presentation/UK’s recent life expectancy slowdown.pptx
+++ b/presentation/UK’s recent life expectancy slowdown.pptx
@@ -16,12 +16,19 @@
     <p:sldId id="265" r:id="rId10"/>
     <p:sldId id="267" r:id="rId11"/>
     <p:sldId id="269" r:id="rId12"/>
-    <p:sldId id="273" r:id="rId13"/>
-    <p:sldId id="271" r:id="rId14"/>
-    <p:sldId id="268" r:id="rId15"/>
-    <p:sldId id="272" r:id="rId16"/>
-    <p:sldId id="266" r:id="rId17"/>
-    <p:sldId id="274" r:id="rId18"/>
+    <p:sldId id="271" r:id="rId13"/>
+    <p:sldId id="268" r:id="rId14"/>
+    <p:sldId id="272" r:id="rId15"/>
+    <p:sldId id="266" r:id="rId16"/>
+    <p:sldId id="274" r:id="rId17"/>
+    <p:sldId id="276" r:id="rId18"/>
+    <p:sldId id="278" r:id="rId19"/>
+    <p:sldId id="279" r:id="rId20"/>
+    <p:sldId id="286" r:id="rId21"/>
+    <p:sldId id="281" r:id="rId22"/>
+    <p:sldId id="282" r:id="rId23"/>
+    <p:sldId id="287" r:id="rId24"/>
+    <p:sldId id="284" r:id="rId25"/>
   </p:sldIdLst>
   <p:sldSz cx="12192000" cy="6858000"/>
   <p:notesSz cx="6858000" cy="9144000"/>
@@ -120,6 +127,47 @@
       </a:defRPr>
     </a:lvl9pPr>
   </p:defaultTextStyle>
+  <p:extLst>
+    <p:ext uri="{521415D9-36F7-43E2-AB2F-B90AF26B5E84}">
+      <p14:sectionLst xmlns:p14="http://schemas.microsoft.com/office/powerpoint/2010/main">
+        <p14:section name="Default Section" id="{3E62B183-3B54-4A6B-A1D8-D0045AC3073D}">
+          <p14:sldIdLst>
+            <p14:sldId id="256"/>
+            <p14:sldId id="257"/>
+            <p14:sldId id="259"/>
+            <p14:sldId id="258"/>
+            <p14:sldId id="260"/>
+            <p14:sldId id="261"/>
+            <p14:sldId id="262"/>
+            <p14:sldId id="263"/>
+            <p14:sldId id="265"/>
+            <p14:sldId id="267"/>
+            <p14:sldId id="269"/>
+            <p14:sldId id="271"/>
+            <p14:sldId id="268"/>
+            <p14:sldId id="272"/>
+            <p14:sldId id="266"/>
+            <p14:sldId id="274"/>
+          </p14:sldIdLst>
+        </p14:section>
+        <p14:section name="Supplementary" id="{A8472721-B19E-4524-A67D-8C594D9C25D5}">
+          <p14:sldIdLst>
+            <p14:sldId id="276"/>
+            <p14:sldId id="278"/>
+            <p14:sldId id="279"/>
+            <p14:sldId id="286"/>
+            <p14:sldId id="281"/>
+            <p14:sldId id="282"/>
+            <p14:sldId id="287"/>
+            <p14:sldId id="284"/>
+          </p14:sldIdLst>
+        </p14:section>
+      </p14:sectionLst>
+    </p:ext>
+    <p:ext uri="{EFAFB233-063F-42B5-8137-9DF3F51BA10A}">
+      <p15:sldGuideLst xmlns:p15="http://schemas.microsoft.com/office/powerpoint/2012/main"/>
+    </p:ext>
+  </p:extLst>
 </p:presentation>
 </file>
 
@@ -167,7 +215,7 @@
           </a:lstStyle>
           <a:p>
             <a:r>
-              <a:rPr lang="en-US" smtClean="0"/>
+              <a:rPr lang="en-US"/>
               <a:t>Click to edit Master title style</a:t>
             </a:r>
             <a:endParaRPr lang="en-US" dirty="0"/>
@@ -284,7 +332,7 @@
           </a:lstStyle>
           <a:p>
             <a:r>
-              <a:rPr lang="en-US" smtClean="0"/>
+              <a:rPr lang="en-US"/>
               <a:t>Click to edit Master subtitle style</a:t>
             </a:r>
             <a:endParaRPr lang="en-US" dirty="0"/>
@@ -443,7 +491,7 @@
           </a:lstStyle>
           <a:p>
             <a:r>
-              <a:rPr lang="en-US" smtClean="0"/>
+              <a:rPr lang="en-US"/>
               <a:t>Click to edit Master title style</a:t>
             </a:r>
             <a:endParaRPr lang="en-US" dirty="0"/>
@@ -517,7 +565,7 @@
           </a:lstStyle>
           <a:p>
             <a:r>
-              <a:rPr lang="en-US" smtClean="0"/>
+              <a:rPr lang="en-US"/>
               <a:t>Click icon to add picture</a:t>
             </a:r>
             <a:endParaRPr lang="en-US" dirty="0"/>
@@ -583,7 +631,7 @@
           <a:p>
             <a:pPr lvl="0"/>
             <a:r>
-              <a:rPr lang="en-US" smtClean="0"/>
+              <a:rPr lang="en-US"/>
               <a:t>Click to edit Master text styles</a:t>
             </a:r>
           </a:p>
@@ -709,7 +757,7 @@
           </a:lstStyle>
           <a:p>
             <a:r>
-              <a:rPr lang="en-US" smtClean="0"/>
+              <a:rPr lang="en-US"/>
               <a:t>Click to edit Master title style</a:t>
             </a:r>
             <a:endParaRPr lang="en-US" dirty="0"/>
@@ -775,7 +823,7 @@
           <a:p>
             <a:pPr lvl="0"/>
             <a:r>
-              <a:rPr lang="en-US" smtClean="0"/>
+              <a:rPr lang="en-US"/>
               <a:t>Click to edit Master text styles</a:t>
             </a:r>
           </a:p>
@@ -901,7 +949,7 @@
           </a:lstStyle>
           <a:p>
             <a:r>
-              <a:rPr lang="en-US" smtClean="0"/>
+              <a:rPr lang="en-US"/>
               <a:t>Click to edit Master title style</a:t>
             </a:r>
             <a:endParaRPr lang="en-US" dirty="0"/>
@@ -969,7 +1017,7 @@
           <a:p>
             <a:pPr lvl="0"/>
             <a:r>
-              <a:rPr lang="en-US" smtClean="0"/>
+              <a:rPr lang="en-US"/>
               <a:t>Click to edit Master text styles</a:t>
             </a:r>
           </a:p>
@@ -1036,7 +1084,7 @@
           <a:p>
             <a:pPr lvl="0"/>
             <a:r>
-              <a:rPr lang="en-US" smtClean="0"/>
+              <a:rPr lang="en-US"/>
               <a:t>Click to edit Master text styles</a:t>
             </a:r>
           </a:p>
@@ -1394,7 +1442,7 @@
           </a:lstStyle>
           <a:p>
             <a:r>
-              <a:rPr lang="en-US" smtClean="0"/>
+              <a:rPr lang="en-US"/>
               <a:t>Click to edit Master title style</a:t>
             </a:r>
             <a:endParaRPr lang="en-US" dirty="0"/>
@@ -1460,7 +1508,7 @@
           <a:p>
             <a:pPr lvl="0"/>
             <a:r>
-              <a:rPr lang="en-US" smtClean="0"/>
+              <a:rPr lang="en-US"/>
               <a:t>Click to edit Master text styles</a:t>
             </a:r>
           </a:p>
@@ -1582,7 +1630,7 @@
           <a:lstStyle/>
           <a:p>
             <a:r>
-              <a:rPr lang="en-US" smtClean="0"/>
+              <a:rPr lang="en-US"/>
               <a:t>Click to edit Master title style</a:t>
             </a:r>
             <a:endParaRPr lang="en-US" dirty="0"/>
@@ -1654,7 +1702,7 @@
           <a:p>
             <a:pPr lvl="0"/>
             <a:r>
-              <a:rPr lang="en-US" smtClean="0"/>
+              <a:rPr lang="en-US"/>
               <a:t>Click to edit Master text styles</a:t>
             </a:r>
           </a:p>
@@ -1721,7 +1769,7 @@
           <a:p>
             <a:pPr lvl="0"/>
             <a:r>
-              <a:rPr lang="en-US" smtClean="0"/>
+              <a:rPr lang="en-US"/>
               <a:t>Click to edit Master text styles</a:t>
             </a:r>
           </a:p>
@@ -1792,7 +1840,7 @@
           <a:p>
             <a:pPr lvl="0"/>
             <a:r>
-              <a:rPr lang="en-US" smtClean="0"/>
+              <a:rPr lang="en-US"/>
               <a:t>Click to edit Master text styles</a:t>
             </a:r>
           </a:p>
@@ -1859,7 +1907,7 @@
           <a:p>
             <a:pPr lvl="0"/>
             <a:r>
-              <a:rPr lang="en-US" smtClean="0"/>
+              <a:rPr lang="en-US"/>
               <a:t>Click to edit Master text styles</a:t>
             </a:r>
           </a:p>
@@ -1930,7 +1978,7 @@
           <a:p>
             <a:pPr lvl="0"/>
             <a:r>
-              <a:rPr lang="en-US" smtClean="0"/>
+              <a:rPr lang="en-US"/>
               <a:t>Click to edit Master text styles</a:t>
             </a:r>
           </a:p>
@@ -1997,7 +2045,7 @@
           <a:p>
             <a:pPr lvl="0"/>
             <a:r>
-              <a:rPr lang="en-US" smtClean="0"/>
+              <a:rPr lang="en-US"/>
               <a:t>Click to edit Master text styles</a:t>
             </a:r>
           </a:p>
@@ -2209,7 +2257,7 @@
           <a:lstStyle/>
           <a:p>
             <a:r>
-              <a:rPr lang="en-US" smtClean="0"/>
+              <a:rPr lang="en-US"/>
               <a:t>Click to edit Master title style</a:t>
             </a:r>
             <a:endParaRPr lang="en-US" dirty="0"/>
@@ -2281,7 +2329,7 @@
           <a:p>
             <a:pPr lvl="0"/>
             <a:r>
-              <a:rPr lang="en-US" smtClean="0"/>
+              <a:rPr lang="en-US"/>
               <a:t>Click to edit Master text styles</a:t>
             </a:r>
           </a:p>
@@ -2359,7 +2407,7 @@
           </a:lstStyle>
           <a:p>
             <a:r>
-              <a:rPr lang="en-US" smtClean="0"/>
+              <a:rPr lang="en-US"/>
               <a:t>Click icon to add picture</a:t>
             </a:r>
             <a:endParaRPr lang="en-US" dirty="0"/>
@@ -2427,7 +2475,7 @@
           <a:p>
             <a:pPr lvl="0"/>
             <a:r>
-              <a:rPr lang="en-US" smtClean="0"/>
+              <a:rPr lang="en-US"/>
               <a:t>Click to edit Master text styles</a:t>
             </a:r>
           </a:p>
@@ -2498,7 +2546,7 @@
           <a:p>
             <a:pPr lvl="0"/>
             <a:r>
-              <a:rPr lang="en-US" smtClean="0"/>
+              <a:rPr lang="en-US"/>
               <a:t>Click to edit Master text styles</a:t>
             </a:r>
           </a:p>
@@ -2576,7 +2624,7 @@
           </a:lstStyle>
           <a:p>
             <a:r>
-              <a:rPr lang="en-US" smtClean="0"/>
+              <a:rPr lang="en-US"/>
               <a:t>Click icon to add picture</a:t>
             </a:r>
             <a:endParaRPr lang="en-US" dirty="0"/>
@@ -2644,7 +2692,7 @@
           <a:p>
             <a:pPr lvl="0"/>
             <a:r>
-              <a:rPr lang="en-US" smtClean="0"/>
+              <a:rPr lang="en-US"/>
               <a:t>Click to edit Master text styles</a:t>
             </a:r>
           </a:p>
@@ -2715,7 +2763,7 @@
           <a:p>
             <a:pPr lvl="0"/>
             <a:r>
-              <a:rPr lang="en-US" smtClean="0"/>
+              <a:rPr lang="en-US"/>
               <a:t>Click to edit Master text styles</a:t>
             </a:r>
           </a:p>
@@ -2793,7 +2841,7 @@
           </a:lstStyle>
           <a:p>
             <a:r>
-              <a:rPr lang="en-US" smtClean="0"/>
+              <a:rPr lang="en-US"/>
               <a:t>Click icon to add picture</a:t>
             </a:r>
             <a:endParaRPr lang="en-US" dirty="0"/>
@@ -2861,7 +2909,7 @@
           <a:p>
             <a:pPr lvl="0"/>
             <a:r>
-              <a:rPr lang="en-US" smtClean="0"/>
+              <a:rPr lang="en-US"/>
               <a:t>Click to edit Master text styles</a:t>
             </a:r>
           </a:p>
@@ -2978,7 +3026,7 @@
           <a:lstStyle/>
           <a:p>
             <a:r>
-              <a:rPr lang="en-US" smtClean="0"/>
+              <a:rPr lang="en-US"/>
               <a:t>Click to edit Master title style</a:t>
             </a:r>
             <a:endParaRPr lang="en-US" dirty="0"/>
@@ -3002,35 +3050,35 @@
           <a:p>
             <a:pPr lvl="0"/>
             <a:r>
-              <a:rPr lang="en-US" smtClean="0"/>
+              <a:rPr lang="en-US"/>
               <a:t>Click to edit Master text styles</a:t>
             </a:r>
           </a:p>
           <a:p>
             <a:pPr lvl="1"/>
             <a:r>
-              <a:rPr lang="en-US" smtClean="0"/>
+              <a:rPr lang="en-US"/>
               <a:t>Second level</a:t>
             </a:r>
           </a:p>
           <a:p>
             <a:pPr lvl="2"/>
             <a:r>
-              <a:rPr lang="en-US" smtClean="0"/>
+              <a:rPr lang="en-US"/>
               <a:t>Third level</a:t>
             </a:r>
           </a:p>
           <a:p>
             <a:pPr lvl="3"/>
             <a:r>
-              <a:rPr lang="en-US" smtClean="0"/>
+              <a:rPr lang="en-US"/>
               <a:t>Fourth level</a:t>
             </a:r>
           </a:p>
           <a:p>
             <a:pPr lvl="4"/>
             <a:r>
-              <a:rPr lang="en-US" smtClean="0"/>
+              <a:rPr lang="en-US"/>
               <a:t>Fifth level</a:t>
             </a:r>
             <a:endParaRPr lang="en-US" dirty="0"/>
@@ -3157,7 +3205,7 @@
           </a:lstStyle>
           <a:p>
             <a:r>
-              <a:rPr lang="en-US" smtClean="0"/>
+              <a:rPr lang="en-US"/>
               <a:t>Click to edit Master title style</a:t>
             </a:r>
             <a:endParaRPr lang="en-US" dirty="0"/>
@@ -3186,35 +3234,35 @@
           <a:p>
             <a:pPr lvl="0"/>
             <a:r>
-              <a:rPr lang="en-US" smtClean="0"/>
+              <a:rPr lang="en-US"/>
               <a:t>Click to edit Master text styles</a:t>
             </a:r>
           </a:p>
           <a:p>
             <a:pPr lvl="1"/>
             <a:r>
-              <a:rPr lang="en-US" smtClean="0"/>
+              <a:rPr lang="en-US"/>
               <a:t>Second level</a:t>
             </a:r>
           </a:p>
           <a:p>
             <a:pPr lvl="2"/>
             <a:r>
-              <a:rPr lang="en-US" smtClean="0"/>
+              <a:rPr lang="en-US"/>
               <a:t>Third level</a:t>
             </a:r>
           </a:p>
           <a:p>
             <a:pPr lvl="3"/>
             <a:r>
-              <a:rPr lang="en-US" smtClean="0"/>
+              <a:rPr lang="en-US"/>
               <a:t>Fourth level</a:t>
             </a:r>
           </a:p>
           <a:p>
             <a:pPr lvl="4"/>
             <a:r>
-              <a:rPr lang="en-US" smtClean="0"/>
+              <a:rPr lang="en-US"/>
               <a:t>Fifth level</a:t>
             </a:r>
             <a:endParaRPr lang="en-US" dirty="0"/>
@@ -3332,7 +3380,7 @@
           <a:lstStyle/>
           <a:p>
             <a:r>
-              <a:rPr lang="en-US" smtClean="0"/>
+              <a:rPr lang="en-US"/>
               <a:t>Click to edit Master title style</a:t>
             </a:r>
             <a:endParaRPr lang="en-US" dirty="0"/>
@@ -3356,35 +3404,35 @@
           <a:p>
             <a:pPr lvl="0"/>
             <a:r>
-              <a:rPr lang="en-US" smtClean="0"/>
+              <a:rPr lang="en-US"/>
               <a:t>Click to edit Master text styles</a:t>
             </a:r>
           </a:p>
           <a:p>
             <a:pPr lvl="1"/>
             <a:r>
-              <a:rPr lang="en-US" smtClean="0"/>
+              <a:rPr lang="en-US"/>
               <a:t>Second level</a:t>
             </a:r>
           </a:p>
           <a:p>
             <a:pPr lvl="2"/>
             <a:r>
-              <a:rPr lang="en-US" smtClean="0"/>
+              <a:rPr lang="en-US"/>
               <a:t>Third level</a:t>
             </a:r>
           </a:p>
           <a:p>
             <a:pPr lvl="3"/>
             <a:r>
-              <a:rPr lang="en-US" smtClean="0"/>
+              <a:rPr lang="en-US"/>
               <a:t>Fourth level</a:t>
             </a:r>
           </a:p>
           <a:p>
             <a:pPr lvl="4"/>
             <a:r>
-              <a:rPr lang="en-US" smtClean="0"/>
+              <a:rPr lang="en-US"/>
               <a:t>Fifth level</a:t>
             </a:r>
             <a:endParaRPr lang="en-US" dirty="0"/>
@@ -3511,7 +3559,7 @@
           </a:lstStyle>
           <a:p>
             <a:r>
-              <a:rPr lang="en-US" smtClean="0"/>
+              <a:rPr lang="en-US"/>
               <a:t>Click to edit Master title style</a:t>
             </a:r>
             <a:endParaRPr lang="en-US" dirty="0"/>
@@ -3629,7 +3677,7 @@
           <a:p>
             <a:pPr lvl="0"/>
             <a:r>
-              <a:rPr lang="en-US" smtClean="0"/>
+              <a:rPr lang="en-US"/>
               <a:t>Click to edit Master text styles</a:t>
             </a:r>
           </a:p>
@@ -3746,7 +3794,7 @@
           <a:lstStyle/>
           <a:p>
             <a:r>
-              <a:rPr lang="en-US" smtClean="0"/>
+              <a:rPr lang="en-US"/>
               <a:t>Click to edit Master title style</a:t>
             </a:r>
             <a:endParaRPr lang="en-US" dirty="0"/>
@@ -3777,35 +3825,35 @@
           <a:p>
             <a:pPr lvl="0"/>
             <a:r>
-              <a:rPr lang="en-US" smtClean="0"/>
+              <a:rPr lang="en-US"/>
               <a:t>Click to edit Master text styles</a:t>
             </a:r>
           </a:p>
           <a:p>
             <a:pPr lvl="1"/>
             <a:r>
-              <a:rPr lang="en-US" smtClean="0"/>
+              <a:rPr lang="en-US"/>
               <a:t>Second level</a:t>
             </a:r>
           </a:p>
           <a:p>
             <a:pPr lvl="2"/>
             <a:r>
-              <a:rPr lang="en-US" smtClean="0"/>
+              <a:rPr lang="en-US"/>
               <a:t>Third level</a:t>
             </a:r>
           </a:p>
           <a:p>
             <a:pPr lvl="3"/>
             <a:r>
-              <a:rPr lang="en-US" smtClean="0"/>
+              <a:rPr lang="en-US"/>
               <a:t>Fourth level</a:t>
             </a:r>
           </a:p>
           <a:p>
             <a:pPr lvl="4"/>
             <a:r>
-              <a:rPr lang="en-US" smtClean="0"/>
+              <a:rPr lang="en-US"/>
               <a:t>Fifth level</a:t>
             </a:r>
             <a:endParaRPr lang="en-US" dirty="0"/>
@@ -3836,35 +3884,35 @@
           <a:p>
             <a:pPr lvl="0"/>
             <a:r>
-              <a:rPr lang="en-US" smtClean="0"/>
+              <a:rPr lang="en-US"/>
               <a:t>Click to edit Master text styles</a:t>
             </a:r>
           </a:p>
           <a:p>
             <a:pPr lvl="1"/>
             <a:r>
-              <a:rPr lang="en-US" smtClean="0"/>
+              <a:rPr lang="en-US"/>
               <a:t>Second level</a:t>
             </a:r>
           </a:p>
           <a:p>
             <a:pPr lvl="2"/>
             <a:r>
-              <a:rPr lang="en-US" smtClean="0"/>
+              <a:rPr lang="en-US"/>
               <a:t>Third level</a:t>
             </a:r>
           </a:p>
           <a:p>
             <a:pPr lvl="3"/>
             <a:r>
-              <a:rPr lang="en-US" smtClean="0"/>
+              <a:rPr lang="en-US"/>
               <a:t>Fourth level</a:t>
             </a:r>
           </a:p>
           <a:p>
             <a:pPr lvl="4"/>
             <a:r>
-              <a:rPr lang="en-US" smtClean="0"/>
+              <a:rPr lang="en-US"/>
               <a:t>Fifth level</a:t>
             </a:r>
             <a:endParaRPr lang="en-US" dirty="0"/>
@@ -4046,7 +4094,7 @@
           </a:lstStyle>
           <a:p>
             <a:r>
-              <a:rPr lang="en-US" smtClean="0"/>
+              <a:rPr lang="en-US"/>
               <a:t>Click to edit Master title style</a:t>
             </a:r>
             <a:endParaRPr lang="en-US" dirty="0"/>
@@ -4114,7 +4162,7 @@
           <a:p>
             <a:pPr lvl="0"/>
             <a:r>
-              <a:rPr lang="en-US" smtClean="0"/>
+              <a:rPr lang="en-US"/>
               <a:t>Click to edit Master text styles</a:t>
             </a:r>
           </a:p>
@@ -4160,35 +4208,35 @@
           <a:p>
             <a:pPr lvl="0"/>
             <a:r>
-              <a:rPr lang="en-US" smtClean="0"/>
+              <a:rPr lang="en-US"/>
               <a:t>Click to edit Master text styles</a:t>
             </a:r>
           </a:p>
           <a:p>
             <a:pPr lvl="1"/>
             <a:r>
-              <a:rPr lang="en-US" smtClean="0"/>
+              <a:rPr lang="en-US"/>
               <a:t>Second level</a:t>
             </a:r>
           </a:p>
           <a:p>
             <a:pPr lvl="2"/>
             <a:r>
-              <a:rPr lang="en-US" smtClean="0"/>
+              <a:rPr lang="en-US"/>
               <a:t>Third level</a:t>
             </a:r>
           </a:p>
           <a:p>
             <a:pPr lvl="3"/>
             <a:r>
-              <a:rPr lang="en-US" smtClean="0"/>
+              <a:rPr lang="en-US"/>
               <a:t>Fourth level</a:t>
             </a:r>
           </a:p>
           <a:p>
             <a:pPr lvl="4"/>
             <a:r>
-              <a:rPr lang="en-US" smtClean="0"/>
+              <a:rPr lang="en-US"/>
               <a:t>Fifth level</a:t>
             </a:r>
             <a:endParaRPr lang="en-US" dirty="0"/>
@@ -4256,7 +4304,7 @@
           <a:p>
             <a:pPr lvl="0"/>
             <a:r>
-              <a:rPr lang="en-US" smtClean="0"/>
+              <a:rPr lang="en-US"/>
               <a:t>Click to edit Master text styles</a:t>
             </a:r>
           </a:p>
@@ -4302,35 +4350,35 @@
           <a:p>
             <a:pPr lvl="0"/>
             <a:r>
-              <a:rPr lang="en-US" smtClean="0"/>
+              <a:rPr lang="en-US"/>
               <a:t>Click to edit Master text styles</a:t>
             </a:r>
           </a:p>
           <a:p>
             <a:pPr lvl="1"/>
             <a:r>
-              <a:rPr lang="en-US" smtClean="0"/>
+              <a:rPr lang="en-US"/>
               <a:t>Second level</a:t>
             </a:r>
           </a:p>
           <a:p>
             <a:pPr lvl="2"/>
             <a:r>
-              <a:rPr lang="en-US" smtClean="0"/>
+              <a:rPr lang="en-US"/>
               <a:t>Third level</a:t>
             </a:r>
           </a:p>
           <a:p>
             <a:pPr lvl="3"/>
             <a:r>
-              <a:rPr lang="en-US" smtClean="0"/>
+              <a:rPr lang="en-US"/>
               <a:t>Fourth level</a:t>
             </a:r>
           </a:p>
           <a:p>
             <a:pPr lvl="4"/>
             <a:r>
-              <a:rPr lang="en-US" smtClean="0"/>
+              <a:rPr lang="en-US"/>
               <a:t>Fifth level</a:t>
             </a:r>
             <a:endParaRPr lang="en-US" dirty="0"/>
@@ -4448,7 +4496,7 @@
           <a:lstStyle/>
           <a:p>
             <a:r>
-              <a:rPr lang="en-US" smtClean="0"/>
+              <a:rPr lang="en-US"/>
               <a:t>Click to edit Master title style</a:t>
             </a:r>
             <a:endParaRPr lang="en-US" dirty="0"/>
@@ -4672,7 +4720,7 @@
           </a:lstStyle>
           <a:p>
             <a:r>
-              <a:rPr lang="en-US" smtClean="0"/>
+              <a:rPr lang="en-US"/>
               <a:t>Click to edit Master title style</a:t>
             </a:r>
             <a:endParaRPr lang="en-US" dirty="0"/>
@@ -4703,35 +4751,35 @@
           <a:p>
             <a:pPr lvl="0"/>
             <a:r>
-              <a:rPr lang="en-US" smtClean="0"/>
+              <a:rPr lang="en-US"/>
               <a:t>Click to edit Master text styles</a:t>
             </a:r>
           </a:p>
           <a:p>
             <a:pPr lvl="1"/>
             <a:r>
-              <a:rPr lang="en-US" smtClean="0"/>
+              <a:rPr lang="en-US"/>
               <a:t>Second level</a:t>
             </a:r>
           </a:p>
           <a:p>
             <a:pPr lvl="2"/>
             <a:r>
-              <a:rPr lang="en-US" smtClean="0"/>
+              <a:rPr lang="en-US"/>
               <a:t>Third level</a:t>
             </a:r>
           </a:p>
           <a:p>
             <a:pPr lvl="3"/>
             <a:r>
-              <a:rPr lang="en-US" smtClean="0"/>
+              <a:rPr lang="en-US"/>
               <a:t>Fourth level</a:t>
             </a:r>
           </a:p>
           <a:p>
             <a:pPr lvl="4"/>
             <a:r>
-              <a:rPr lang="en-US" smtClean="0"/>
+              <a:rPr lang="en-US"/>
               <a:t>Fifth level</a:t>
             </a:r>
             <a:endParaRPr lang="en-US" dirty="0"/>
@@ -4799,7 +4847,7 @@
           <a:p>
             <a:pPr lvl="0"/>
             <a:r>
-              <a:rPr lang="en-US" smtClean="0"/>
+              <a:rPr lang="en-US"/>
               <a:t>Click to edit Master text styles</a:t>
             </a:r>
           </a:p>
@@ -4957,7 +5005,7 @@
           </a:lstStyle>
           <a:p>
             <a:r>
-              <a:rPr lang="en-US" smtClean="0"/>
+              <a:rPr lang="en-US"/>
               <a:t>Click to edit Master title style</a:t>
             </a:r>
             <a:endParaRPr lang="en-US" dirty="0"/>
@@ -5031,7 +5079,7 @@
           </a:lstStyle>
           <a:p>
             <a:r>
-              <a:rPr lang="en-US" smtClean="0"/>
+              <a:rPr lang="en-US"/>
               <a:t>Click icon to add picture</a:t>
             </a:r>
             <a:endParaRPr lang="en-US" dirty="0"/>
@@ -5099,7 +5147,7 @@
           <a:p>
             <a:pPr lvl="0"/>
             <a:r>
-              <a:rPr lang="en-US" smtClean="0"/>
+              <a:rPr lang="en-US"/>
               <a:t>Click to edit Master text styles</a:t>
             </a:r>
           </a:p>
@@ -5238,7 +5286,7 @@
           <a:lstStyle/>
           <a:p>
             <a:r>
-              <a:rPr lang="en-US" smtClean="0"/>
+              <a:rPr lang="en-US"/>
               <a:t>Click to edit Master title style</a:t>
             </a:r>
             <a:endParaRPr lang="en-US" dirty="0"/>
@@ -5279,35 +5327,35 @@
           <a:p>
             <a:pPr lvl="0"/>
             <a:r>
-              <a:rPr lang="en-US" smtClean="0"/>
+              <a:rPr lang="en-US"/>
               <a:t>Click to edit Master text styles</a:t>
             </a:r>
           </a:p>
           <a:p>
             <a:pPr lvl="1"/>
             <a:r>
-              <a:rPr lang="en-US" smtClean="0"/>
+              <a:rPr lang="en-US"/>
               <a:t>Second level</a:t>
             </a:r>
           </a:p>
           <a:p>
             <a:pPr lvl="2"/>
             <a:r>
-              <a:rPr lang="en-US" smtClean="0"/>
+              <a:rPr lang="en-US"/>
               <a:t>Third level</a:t>
             </a:r>
           </a:p>
           <a:p>
             <a:pPr lvl="3"/>
             <a:r>
-              <a:rPr lang="en-US" smtClean="0"/>
+              <a:rPr lang="en-US"/>
               <a:t>Fourth level</a:t>
             </a:r>
           </a:p>
           <a:p>
             <a:pPr lvl="4"/>
             <a:r>
-              <a:rPr lang="en-US" smtClean="0"/>
+              <a:rPr lang="en-US"/>
               <a:t>Fifth level</a:t>
             </a:r>
             <a:endParaRPr lang="en-US" dirty="0"/>
@@ -6048,18 +6096,17 @@
           <a:lstStyle/>
           <a:p>
             <a:r>
-              <a:rPr lang="en-GB" dirty="0" smtClean="0"/>
+              <a:rPr lang="en-GB" dirty="0"/>
               <a:t>UK’s recent life expectancy slowdown: </a:t>
             </a:r>
             <a:r>
-              <a:rPr lang="en-GB" i="1" dirty="0" smtClean="0"/>
+              <a:rPr lang="en-GB" i="1" dirty="0"/>
               <a:t>not </a:t>
             </a:r>
             <a:r>
-              <a:rPr lang="en-GB" dirty="0" smtClean="0"/>
+              <a:rPr lang="en-GB" dirty="0"/>
               <a:t>due to reaching a natural limit</a:t>
             </a:r>
-            <a:endParaRPr lang="en-GB" dirty="0"/>
           </a:p>
         </p:txBody>
       </p:sp>
@@ -6081,34 +6128,33 @@
           <a:lstStyle/>
           <a:p>
             <a:r>
-              <a:rPr lang="en-GB" dirty="0" smtClean="0"/>
+              <a:rPr lang="en-GB" dirty="0"/>
               <a:t>Dr Jon Minton</a:t>
             </a:r>
           </a:p>
           <a:p>
             <a:r>
-              <a:rPr lang="en-GB" dirty="0" smtClean="0">
+              <a:rPr lang="en-GB" dirty="0">
                 <a:hlinkClick r:id="rId2"/>
               </a:rPr>
               <a:t>Jon.minton@nhs.net</a:t>
             </a:r>
             <a:r>
-              <a:rPr lang="en-GB" dirty="0" smtClean="0"/>
+              <a:rPr lang="en-GB" dirty="0"/>
               <a:t> </a:t>
             </a:r>
           </a:p>
           <a:p>
             <a:r>
-              <a:rPr lang="en-GB" dirty="0" smtClean="0"/>
+              <a:rPr lang="en-GB" dirty="0"/>
               <a:t>Public Health Intelligence Adviser</a:t>
             </a:r>
           </a:p>
           <a:p>
             <a:r>
-              <a:rPr lang="en-GB" dirty="0" smtClean="0"/>
+              <a:rPr lang="en-GB" dirty="0"/>
               <a:t>NHS Health Scotland</a:t>
             </a:r>
-            <a:endParaRPr lang="en-GB" dirty="0"/>
           </a:p>
         </p:txBody>
       </p:sp>
@@ -6122,13 +6168,6 @@
   <p:clrMapOvr>
     <a:masterClrMapping/>
   </p:clrMapOvr>
-  <p:timing>
-    <p:tnLst>
-      <p:par>
-        <p:cTn id="1" dur="indefinite" restart="never" nodeType="tmRoot"/>
-      </p:par>
-    </p:tnLst>
-  </p:timing>
 </p:sld>
 </file>
 
@@ -6165,32 +6204,47 @@
           <a:lstStyle/>
           <a:p>
             <a:r>
-              <a:rPr lang="en-GB" dirty="0" smtClean="0"/>
+              <a:rPr lang="en-GB" dirty="0"/>
               <a:t>First claim: UK’s relative position</a:t>
             </a:r>
-            <a:endParaRPr lang="en-GB" dirty="0"/>
-          </a:p>
-        </p:txBody>
-      </p:sp>
-      <p:sp>
-        <p:nvSpPr>
-          <p:cNvPr id="3" name="Content Placeholder 2"/>
-          <p:cNvSpPr>
-            <a:spLocks noGrp="1"/>
-          </p:cNvSpPr>
+          </a:p>
+        </p:txBody>
+      </p:sp>
+      <p:pic>
+        <p:nvPicPr>
+          <p:cNvPr id="7" name="Content Placeholder 6">
+            <a:extLst>
+              <a:ext uri="{FF2B5EF4-FFF2-40B4-BE49-F238E27FC236}">
+                <a16:creationId xmlns:a16="http://schemas.microsoft.com/office/drawing/2014/main" id="{393C3856-1B2B-4681-9621-72C12503101C}"/>
+              </a:ext>
+            </a:extLst>
+          </p:cNvPr>
+          <p:cNvPicPr>
+            <a:picLocks noGrp="1" noChangeAspect="1"/>
+          </p:cNvPicPr>
           <p:nvPr>
             <p:ph idx="1"/>
           </p:nvPr>
-        </p:nvSpPr>
-        <p:spPr/>
-        <p:txBody>
-          <a:bodyPr/>
-          <a:lstStyle/>
-          <a:p>
-            <a:endParaRPr lang="en-GB"/>
-          </a:p>
-        </p:txBody>
-      </p:sp>
+        </p:nvPicPr>
+        <p:blipFill>
+          <a:blip r:embed="rId2" cstate="print">
+            <a:extLst>
+              <a:ext uri="{28A0092B-C50C-407E-A947-70E740481C1C}">
+                <a14:useLocalDpi xmlns:a14="http://schemas.microsoft.com/office/drawing/2010/main" val="0"/>
+              </a:ext>
+            </a:extLst>
+          </a:blip>
+          <a:stretch>
+            <a:fillRect/>
+          </a:stretch>
+        </p:blipFill>
+        <p:spPr>
+          <a:xfrm>
+            <a:off x="2708063" y="1731963"/>
+            <a:ext cx="6766349" cy="4059237"/>
+          </a:xfrm>
+        </p:spPr>
+      </p:pic>
     </p:spTree>
     <p:extLst>
       <p:ext uri="{BB962C8B-B14F-4D97-AF65-F5344CB8AC3E}">
@@ -6201,13 +6255,6 @@
   <p:clrMapOvr>
     <a:masterClrMapping/>
   </p:clrMapOvr>
-  <p:timing>
-    <p:tnLst>
-      <p:par>
-        <p:cTn id="1" dur="indefinite" restart="never" nodeType="tmRoot"/>
-      </p:par>
-    </p:tnLst>
-  </p:timing>
 </p:sld>
 </file>
 
@@ -6246,32 +6293,47 @@
           <a:lstStyle/>
           <a:p>
             <a:r>
-              <a:rPr lang="en-GB" dirty="0" smtClean="0"/>
+              <a:rPr lang="en-GB" dirty="0"/>
               <a:t>First claim: UK relative to average, best performing, and worst performing</a:t>
             </a:r>
-            <a:endParaRPr lang="en-GB" dirty="0"/>
-          </a:p>
-        </p:txBody>
-      </p:sp>
-      <p:sp>
-        <p:nvSpPr>
-          <p:cNvPr id="3" name="Content Placeholder 2"/>
-          <p:cNvSpPr>
-            <a:spLocks noGrp="1"/>
-          </p:cNvSpPr>
+          </a:p>
+        </p:txBody>
+      </p:sp>
+      <p:pic>
+        <p:nvPicPr>
+          <p:cNvPr id="9" name="Content Placeholder 8">
+            <a:extLst>
+              <a:ext uri="{FF2B5EF4-FFF2-40B4-BE49-F238E27FC236}">
+                <a16:creationId xmlns:a16="http://schemas.microsoft.com/office/drawing/2014/main" id="{95DAA9D3-3724-4DF8-A81C-16CB51E98663}"/>
+              </a:ext>
+            </a:extLst>
+          </p:cNvPr>
+          <p:cNvPicPr>
+            <a:picLocks noGrp="1" noChangeAspect="1"/>
+          </p:cNvPicPr>
           <p:nvPr>
             <p:ph idx="1"/>
           </p:nvPr>
-        </p:nvSpPr>
-        <p:spPr/>
-        <p:txBody>
-          <a:bodyPr/>
-          <a:lstStyle/>
-          <a:p>
-            <a:endParaRPr lang="en-GB"/>
-          </a:p>
-        </p:txBody>
-      </p:sp>
+        </p:nvPicPr>
+        <p:blipFill>
+          <a:blip r:embed="rId2" cstate="print">
+            <a:extLst>
+              <a:ext uri="{28A0092B-C50C-407E-A947-70E740481C1C}">
+                <a14:useLocalDpi xmlns:a14="http://schemas.microsoft.com/office/drawing/2010/main" val="0"/>
+              </a:ext>
+            </a:extLst>
+          </a:blip>
+          <a:stretch>
+            <a:fillRect/>
+          </a:stretch>
+        </p:blipFill>
+        <p:spPr>
+          <a:xfrm>
+            <a:off x="2708063" y="1731963"/>
+            <a:ext cx="6766349" cy="4059237"/>
+          </a:xfrm>
+        </p:spPr>
+      </p:pic>
     </p:spTree>
     <p:extLst>
       <p:ext uri="{BB962C8B-B14F-4D97-AF65-F5344CB8AC3E}">
@@ -6282,13 +6344,6 @@
   <p:clrMapOvr>
     <a:masterClrMapping/>
   </p:clrMapOvr>
-  <p:timing>
-    <p:tnLst>
-      <p:par>
-        <p:cTn id="1" dur="indefinite" restart="never" nodeType="tmRoot"/>
-      </p:par>
-    </p:tnLst>
-  </p:timing>
 </p:sld>
 </file>
 
@@ -6327,49 +6382,105 @@
           <a:lstStyle/>
           <a:p>
             <a:r>
-              <a:rPr lang="en-GB" dirty="0" smtClean="0"/>
-              <a:t>First claim: UK relative to average, best performing, and worst performing</a:t>
-            </a:r>
+              <a:rPr lang="en-GB" dirty="0"/>
+              <a:t>Second Claim: Improvements Fall as Life Expectancy Rises</a:t>
+            </a:r>
+          </a:p>
+        </p:txBody>
+      </p:sp>
+      <p:sp>
+        <p:nvSpPr>
+          <p:cNvPr id="3" name="Content Placeholder 2"/>
+          <p:cNvSpPr>
+            <a:spLocks noGrp="1"/>
+          </p:cNvSpPr>
+          <p:nvPr>
+            <p:ph idx="1"/>
+          </p:nvPr>
+        </p:nvSpPr>
+        <p:spPr/>
+        <p:txBody>
+          <a:bodyPr>
+            <a:normAutofit lnSpcReduction="10000"/>
+          </a:bodyPr>
+          <a:lstStyle/>
+          <a:p>
+            <a:r>
+              <a:rPr lang="en-GB" dirty="0"/>
+              <a:t>Data:</a:t>
+            </a:r>
+          </a:p>
+          <a:p>
+            <a:pPr lvl="1"/>
+            <a:r>
+              <a:rPr lang="en-GB" dirty="0"/>
+              <a:t>Life expectancy in 1955</a:t>
+            </a:r>
+          </a:p>
+          <a:p>
+            <a:pPr lvl="1"/>
+            <a:r>
+              <a:rPr lang="en-GB" dirty="0"/>
+              <a:t>Average annual change in life expectancy from 1955-1996</a:t>
+            </a:r>
+          </a:p>
+          <a:p>
+            <a:pPr lvl="1"/>
+            <a:r>
+              <a:rPr lang="en-GB" dirty="0"/>
+              <a:t>21 high income countries</a:t>
+            </a:r>
+          </a:p>
+          <a:p>
+            <a:pPr lvl="1"/>
+            <a:r>
+              <a:rPr lang="en-GB" dirty="0"/>
+              <a:t>Source: Human Mortality Database</a:t>
+            </a:r>
+          </a:p>
+          <a:p>
+            <a:pPr lvl="1"/>
             <a:endParaRPr lang="en-GB" dirty="0"/>
           </a:p>
-        </p:txBody>
-      </p:sp>
-      <p:sp>
-        <p:nvSpPr>
-          <p:cNvPr id="3" name="Content Placeholder 2"/>
-          <p:cNvSpPr>
-            <a:spLocks noGrp="1"/>
-          </p:cNvSpPr>
-          <p:nvPr>
-            <p:ph idx="1"/>
-          </p:nvPr>
-        </p:nvSpPr>
-        <p:spPr/>
-        <p:txBody>
-          <a:bodyPr/>
-          <a:lstStyle/>
-          <a:p>
-            <a:endParaRPr lang="en-GB"/>
+          <a:p>
+            <a:r>
+              <a:rPr lang="en-GB" dirty="0"/>
+              <a:t>Methods:</a:t>
+            </a:r>
+          </a:p>
+          <a:p>
+            <a:pPr lvl="1"/>
+            <a:r>
+              <a:rPr lang="en-GB" dirty="0"/>
+              <a:t>Scatterplot</a:t>
+            </a:r>
+          </a:p>
+          <a:p>
+            <a:pPr lvl="1"/>
+            <a:r>
+              <a:rPr lang="en-GB" dirty="0"/>
+              <a:t>Regression line</a:t>
+            </a:r>
+          </a:p>
+          <a:p>
+            <a:pPr lvl="1"/>
+            <a:r>
+              <a:rPr lang="en-GB" dirty="0"/>
+              <a:t>Descriptive interpretation</a:t>
+            </a:r>
           </a:p>
         </p:txBody>
       </p:sp>
     </p:spTree>
     <p:extLst>
       <p:ext uri="{BB962C8B-B14F-4D97-AF65-F5344CB8AC3E}">
-        <p14:creationId xmlns:p14="http://schemas.microsoft.com/office/powerpoint/2010/main" val="1396292573"/>
+        <p14:creationId xmlns:p14="http://schemas.microsoft.com/office/powerpoint/2010/main" val="3991309509"/>
       </p:ext>
     </p:extLst>
   </p:cSld>
   <p:clrMapOvr>
     <a:masterClrMapping/>
   </p:clrMapOvr>
-  <p:timing>
-    <p:tnLst>
-      <p:par>
-        <p:cTn id="1" dur="indefinite" restart="never" nodeType="tmRoot"/>
-      </p:par>
-    </p:tnLst>
-  </p:timing>
 </p:sld>
 </file>
 
@@ -6402,120 +6513,61 @@
         </p:nvSpPr>
         <p:spPr/>
         <p:txBody>
-          <a:bodyPr>
-            <a:normAutofit fontScale="90000"/>
-          </a:bodyPr>
-          <a:lstStyle/>
-          <a:p>
-            <a:r>
-              <a:rPr lang="en-GB" dirty="0" smtClean="0"/>
-              <a:t>Second Claim: Improvements Fall as Life Expectancy Rises</a:t>
-            </a:r>
-            <a:endParaRPr lang="en-GB" dirty="0"/>
-          </a:p>
-        </p:txBody>
-      </p:sp>
-      <p:sp>
-        <p:nvSpPr>
-          <p:cNvPr id="3" name="Content Placeholder 2"/>
-          <p:cNvSpPr>
-            <a:spLocks noGrp="1"/>
-          </p:cNvSpPr>
+          <a:bodyPr/>
+          <a:lstStyle/>
+          <a:p>
+            <a:r>
+              <a:rPr lang="en-GB" dirty="0"/>
+              <a:t>Second Claim: Replication</a:t>
+            </a:r>
+          </a:p>
+        </p:txBody>
+      </p:sp>
+      <p:pic>
+        <p:nvPicPr>
+          <p:cNvPr id="5" name="Content Placeholder 4">
+            <a:extLst>
+              <a:ext uri="{FF2B5EF4-FFF2-40B4-BE49-F238E27FC236}">
+                <a16:creationId xmlns:a16="http://schemas.microsoft.com/office/drawing/2014/main" id="{C8F14535-3CE6-4959-B30B-810444A1EDC4}"/>
+              </a:ext>
+            </a:extLst>
+          </p:cNvPr>
+          <p:cNvPicPr>
+            <a:picLocks noGrp="1" noChangeAspect="1"/>
+          </p:cNvPicPr>
           <p:nvPr>
             <p:ph idx="1"/>
           </p:nvPr>
-        </p:nvSpPr>
-        <p:spPr/>
-        <p:txBody>
-          <a:bodyPr>
-            <a:normAutofit lnSpcReduction="10000"/>
-          </a:bodyPr>
-          <a:lstStyle/>
-          <a:p>
-            <a:r>
-              <a:rPr lang="en-GB" dirty="0" smtClean="0"/>
-              <a:t>Data:</a:t>
-            </a:r>
-          </a:p>
-          <a:p>
-            <a:pPr lvl="1"/>
-            <a:r>
-              <a:rPr lang="en-GB" dirty="0" smtClean="0"/>
-              <a:t>Life expectancy in 1955</a:t>
-            </a:r>
-          </a:p>
-          <a:p>
-            <a:pPr lvl="1"/>
-            <a:r>
-              <a:rPr lang="en-GB" dirty="0" smtClean="0"/>
-              <a:t>Average annual change in life expectancy from 1955-1996</a:t>
-            </a:r>
-          </a:p>
-          <a:p>
-            <a:pPr lvl="1"/>
-            <a:r>
-              <a:rPr lang="en-GB" dirty="0" smtClean="0"/>
-              <a:t>21 high income countries</a:t>
-            </a:r>
-          </a:p>
-          <a:p>
-            <a:pPr lvl="1"/>
-            <a:r>
-              <a:rPr lang="en-GB" dirty="0" smtClean="0"/>
-              <a:t>Source: Human Mortality Database</a:t>
-            </a:r>
-          </a:p>
-          <a:p>
-            <a:pPr lvl="1"/>
-            <a:endParaRPr lang="en-GB" dirty="0"/>
-          </a:p>
-          <a:p>
-            <a:r>
-              <a:rPr lang="en-GB" dirty="0" smtClean="0"/>
-              <a:t>Methods:</a:t>
-            </a:r>
-          </a:p>
-          <a:p>
-            <a:pPr lvl="1"/>
-            <a:r>
-              <a:rPr lang="en-GB" dirty="0" smtClean="0"/>
-              <a:t>Scatterplot</a:t>
-            </a:r>
-          </a:p>
-          <a:p>
-            <a:pPr lvl="1"/>
-            <a:r>
-              <a:rPr lang="en-GB" dirty="0" smtClean="0"/>
-              <a:t>Regression line</a:t>
-            </a:r>
-          </a:p>
-          <a:p>
-            <a:pPr lvl="1"/>
-            <a:r>
-              <a:rPr lang="en-GB" dirty="0" smtClean="0"/>
-              <a:t>Descriptive interpretation</a:t>
-            </a:r>
-            <a:endParaRPr lang="en-GB" dirty="0"/>
-          </a:p>
-        </p:txBody>
-      </p:sp>
+        </p:nvPicPr>
+        <p:blipFill>
+          <a:blip r:embed="rId2" cstate="print">
+            <a:extLst>
+              <a:ext uri="{28A0092B-C50C-407E-A947-70E740481C1C}">
+                <a14:useLocalDpi xmlns:a14="http://schemas.microsoft.com/office/drawing/2010/main" val="0"/>
+              </a:ext>
+            </a:extLst>
+          </a:blip>
+          <a:stretch>
+            <a:fillRect/>
+          </a:stretch>
+        </p:blipFill>
+        <p:spPr>
+          <a:xfrm>
+            <a:off x="2708063" y="1731963"/>
+            <a:ext cx="6766349" cy="4059237"/>
+          </a:xfrm>
+        </p:spPr>
+      </p:pic>
     </p:spTree>
     <p:extLst>
       <p:ext uri="{BB962C8B-B14F-4D97-AF65-F5344CB8AC3E}">
-        <p14:creationId xmlns:p14="http://schemas.microsoft.com/office/powerpoint/2010/main" val="3991309509"/>
+        <p14:creationId xmlns:p14="http://schemas.microsoft.com/office/powerpoint/2010/main" val="315186378"/>
       </p:ext>
     </p:extLst>
   </p:cSld>
   <p:clrMapOvr>
     <a:masterClrMapping/>
   </p:clrMapOvr>
-  <p:timing>
-    <p:tnLst>
-      <p:par>
-        <p:cTn id="1" dur="indefinite" restart="never" nodeType="tmRoot"/>
-      </p:par>
-    </p:tnLst>
-  </p:timing>
 </p:sld>
 </file>
 
@@ -6552,49 +6604,57 @@
           <a:lstStyle/>
           <a:p>
             <a:r>
-              <a:rPr lang="en-GB" dirty="0" smtClean="0"/>
-              <a:t>Second Claim: Replication</a:t>
-            </a:r>
-            <a:endParaRPr lang="en-GB" dirty="0"/>
-          </a:p>
-        </p:txBody>
-      </p:sp>
-      <p:sp>
-        <p:nvSpPr>
-          <p:cNvPr id="3" name="Content Placeholder 2"/>
-          <p:cNvSpPr>
-            <a:spLocks noGrp="1"/>
-          </p:cNvSpPr>
+              <a:rPr lang="en-GB" dirty="0"/>
+              <a:t>Second Claim: Updating</a:t>
+            </a:r>
+          </a:p>
+        </p:txBody>
+      </p:sp>
+      <p:pic>
+        <p:nvPicPr>
+          <p:cNvPr id="5" name="Content Placeholder 4">
+            <a:extLst>
+              <a:ext uri="{FF2B5EF4-FFF2-40B4-BE49-F238E27FC236}">
+                <a16:creationId xmlns:a16="http://schemas.microsoft.com/office/drawing/2014/main" id="{36277F2F-CF40-4FA4-A6D5-C4D5CBD98F47}"/>
+              </a:ext>
+            </a:extLst>
+          </p:cNvPr>
+          <p:cNvPicPr>
+            <a:picLocks noGrp="1" noChangeAspect="1"/>
+          </p:cNvPicPr>
           <p:nvPr>
             <p:ph idx="1"/>
           </p:nvPr>
-        </p:nvSpPr>
-        <p:spPr/>
-        <p:txBody>
-          <a:bodyPr/>
-          <a:lstStyle/>
-          <a:p>
-            <a:endParaRPr lang="en-GB"/>
-          </a:p>
-        </p:txBody>
-      </p:sp>
+        </p:nvPicPr>
+        <p:blipFill>
+          <a:blip r:embed="rId2" cstate="print">
+            <a:extLst>
+              <a:ext uri="{28A0092B-C50C-407E-A947-70E740481C1C}">
+                <a14:useLocalDpi xmlns:a14="http://schemas.microsoft.com/office/drawing/2010/main" val="0"/>
+              </a:ext>
+            </a:extLst>
+          </a:blip>
+          <a:stretch>
+            <a:fillRect/>
+          </a:stretch>
+        </p:blipFill>
+        <p:spPr>
+          <a:xfrm>
+            <a:off x="2708063" y="1731963"/>
+            <a:ext cx="6766349" cy="4059237"/>
+          </a:xfrm>
+        </p:spPr>
+      </p:pic>
     </p:spTree>
     <p:extLst>
       <p:ext uri="{BB962C8B-B14F-4D97-AF65-F5344CB8AC3E}">
-        <p14:creationId xmlns:p14="http://schemas.microsoft.com/office/powerpoint/2010/main" val="315186378"/>
+        <p14:creationId xmlns:p14="http://schemas.microsoft.com/office/powerpoint/2010/main" val="3580588694"/>
       </p:ext>
     </p:extLst>
   </p:cSld>
   <p:clrMapOvr>
     <a:masterClrMapping/>
   </p:clrMapOvr>
-  <p:timing>
-    <p:tnLst>
-      <p:par>
-        <p:cTn id="1" dur="indefinite" restart="never" nodeType="tmRoot"/>
-      </p:par>
-    </p:tnLst>
-  </p:timing>
 </p:sld>
 </file>
 
@@ -6631,49 +6691,57 @@
           <a:lstStyle/>
           <a:p>
             <a:r>
-              <a:rPr lang="en-GB" dirty="0" smtClean="0"/>
-              <a:t>Second Claim: Updating</a:t>
-            </a:r>
-            <a:endParaRPr lang="en-GB" dirty="0"/>
-          </a:p>
-        </p:txBody>
-      </p:sp>
-      <p:sp>
-        <p:nvSpPr>
-          <p:cNvPr id="3" name="Content Placeholder 2"/>
-          <p:cNvSpPr>
-            <a:spLocks noGrp="1"/>
-          </p:cNvSpPr>
+              <a:rPr lang="en-GB" dirty="0"/>
+              <a:t>Second Claim: Trend by mid-decade </a:t>
+            </a:r>
+          </a:p>
+        </p:txBody>
+      </p:sp>
+      <p:pic>
+        <p:nvPicPr>
+          <p:cNvPr id="5" name="Content Placeholder 4">
+            <a:extLst>
+              <a:ext uri="{FF2B5EF4-FFF2-40B4-BE49-F238E27FC236}">
+                <a16:creationId xmlns:a16="http://schemas.microsoft.com/office/drawing/2014/main" id="{DAFA1000-C7DD-44F1-AECC-52DC6B1E0B64}"/>
+              </a:ext>
+            </a:extLst>
+          </p:cNvPr>
+          <p:cNvPicPr>
+            <a:picLocks noGrp="1" noChangeAspect="1"/>
+          </p:cNvPicPr>
           <p:nvPr>
             <p:ph idx="1"/>
           </p:nvPr>
-        </p:nvSpPr>
-        <p:spPr/>
-        <p:txBody>
-          <a:bodyPr/>
-          <a:lstStyle/>
-          <a:p>
-            <a:endParaRPr lang="en-GB"/>
-          </a:p>
-        </p:txBody>
-      </p:sp>
+        </p:nvPicPr>
+        <p:blipFill>
+          <a:blip r:embed="rId2" cstate="print">
+            <a:extLst>
+              <a:ext uri="{28A0092B-C50C-407E-A947-70E740481C1C}">
+                <a14:useLocalDpi xmlns:a14="http://schemas.microsoft.com/office/drawing/2010/main" val="0"/>
+              </a:ext>
+            </a:extLst>
+          </a:blip>
+          <a:stretch>
+            <a:fillRect/>
+          </a:stretch>
+        </p:blipFill>
+        <p:spPr>
+          <a:xfrm>
+            <a:off x="2708063" y="1731963"/>
+            <a:ext cx="6766349" cy="4059237"/>
+          </a:xfrm>
+        </p:spPr>
+      </p:pic>
     </p:spTree>
     <p:extLst>
       <p:ext uri="{BB962C8B-B14F-4D97-AF65-F5344CB8AC3E}">
-        <p14:creationId xmlns:p14="http://schemas.microsoft.com/office/powerpoint/2010/main" val="3580588694"/>
+        <p14:creationId xmlns:p14="http://schemas.microsoft.com/office/powerpoint/2010/main" val="1107446079"/>
       </p:ext>
     </p:extLst>
   </p:cSld>
   <p:clrMapOvr>
     <a:masterClrMapping/>
   </p:clrMapOvr>
-  <p:timing>
-    <p:tnLst>
-      <p:par>
-        <p:cTn id="1" dur="indefinite" restart="never" nodeType="tmRoot"/>
-      </p:par>
-    </p:tnLst>
-  </p:timing>
 </p:sld>
 </file>
 
@@ -6710,10 +6778,9 @@
           <a:lstStyle/>
           <a:p>
             <a:r>
-              <a:rPr lang="en-GB" dirty="0" smtClean="0"/>
-              <a:t>Second Claim: Trend by mid-decade </a:t>
-            </a:r>
-            <a:endParaRPr lang="en-GB" dirty="0"/>
+              <a:rPr lang="en-GB" dirty="0"/>
+              <a:t>Overall Summary</a:t>
+            </a:r>
           </a:p>
         </p:txBody>
       </p:sp>
@@ -6729,30 +6796,95 @@
         </p:nvSpPr>
         <p:spPr/>
         <p:txBody>
-          <a:bodyPr/>
-          <a:lstStyle/>
-          <a:p>
-            <a:endParaRPr lang="en-GB"/>
+          <a:bodyPr>
+            <a:normAutofit lnSpcReduction="10000"/>
+          </a:bodyPr>
+          <a:lstStyle/>
+          <a:p>
+            <a:r>
+              <a:rPr lang="en-GB" dirty="0"/>
+              <a:t>Life Expectancy Trends:</a:t>
+            </a:r>
+          </a:p>
+          <a:p>
+            <a:pPr lvl="1"/>
+            <a:r>
+              <a:rPr lang="en-GB" dirty="0"/>
+              <a:t>Assumption of linear improvements OK</a:t>
+            </a:r>
+          </a:p>
+          <a:p>
+            <a:pPr lvl="2"/>
+            <a:r>
+              <a:rPr lang="en-GB" dirty="0"/>
+              <a:t>Lee 2002 response to White 2002</a:t>
+            </a:r>
+          </a:p>
+          <a:p>
+            <a:pPr lvl="1"/>
+            <a:r>
+              <a:rPr lang="en-GB" dirty="0"/>
+              <a:t>Can also use standard deviation of annual change in life expectancy to set thresholds for what counts as an ‘unusual’ year or group of years</a:t>
+            </a:r>
+          </a:p>
+          <a:p>
+            <a:pPr lvl="1"/>
+            <a:r>
+              <a:rPr lang="en-GB" dirty="0"/>
+              <a:t>UK’s relative position</a:t>
+            </a:r>
+          </a:p>
+          <a:p>
+            <a:pPr lvl="2"/>
+            <a:r>
+              <a:rPr lang="en-GB" dirty="0"/>
+              <a:t>Fell in 60s; converging in 90s-2000s; fell back again after 2012</a:t>
+            </a:r>
+          </a:p>
+          <a:p>
+            <a:r>
+              <a:rPr lang="en-GB" dirty="0"/>
+              <a:t>Slowdown in improvement</a:t>
+            </a:r>
+          </a:p>
+          <a:p>
+            <a:pPr lvl="1"/>
+            <a:r>
+              <a:rPr lang="en-GB" dirty="0"/>
+              <a:t>A slowdown in the slowdown: converging to ~1.5 years gain/decade (0.15 years/year)</a:t>
+            </a:r>
+          </a:p>
+          <a:p>
+            <a:pPr lvl="1"/>
+            <a:r>
+              <a:rPr lang="en-GB" dirty="0"/>
+              <a:t>UK’s fall in relative position, and improvements at below 0.15 years /year, mean long-term secular declines in improvement </a:t>
+            </a:r>
+            <a:r>
+              <a:rPr lang="en-GB" u="sng" dirty="0">
+                <a:solidFill>
+                  <a:srgbClr val="C00000"/>
+                </a:solidFill>
+              </a:rPr>
+              <a:t>do not explain </a:t>
+            </a:r>
+            <a:r>
+              <a:rPr lang="en-GB" dirty="0"/>
+              <a:t>UK’s recent slowdown.</a:t>
+            </a:r>
           </a:p>
         </p:txBody>
       </p:sp>
     </p:spTree>
     <p:extLst>
       <p:ext uri="{BB962C8B-B14F-4D97-AF65-F5344CB8AC3E}">
-        <p14:creationId xmlns:p14="http://schemas.microsoft.com/office/powerpoint/2010/main" val="1107446079"/>
+        <p14:creationId xmlns:p14="http://schemas.microsoft.com/office/powerpoint/2010/main" val="398705804"/>
       </p:ext>
     </p:extLst>
   </p:cSld>
   <p:clrMapOvr>
     <a:masterClrMapping/>
   </p:clrMapOvr>
-  <p:timing>
-    <p:tnLst>
-      <p:par>
-        <p:cTn id="1" dur="indefinite" restart="never" nodeType="tmRoot"/>
-      </p:par>
-    </p:tnLst>
-  </p:timing>
 </p:sld>
 </file>
 
@@ -6775,7 +6907,13 @@
       </p:grpSpPr>
       <p:sp>
         <p:nvSpPr>
-          <p:cNvPr id="2" name="Title 1"/>
+          <p:cNvPr id="2" name="Title 1">
+            <a:extLst>
+              <a:ext uri="{FF2B5EF4-FFF2-40B4-BE49-F238E27FC236}">
+                <a16:creationId xmlns:a16="http://schemas.microsoft.com/office/drawing/2014/main" id="{FD118B99-6F13-461D-AEB3-2E80B8EA0C59}"/>
+              </a:ext>
+            </a:extLst>
+          </p:cNvPr>
           <p:cNvSpPr>
             <a:spLocks noGrp="1"/>
           </p:cNvSpPr>
@@ -6789,122 +6927,246 @@
           <a:lstStyle/>
           <a:p>
             <a:r>
-              <a:rPr lang="en-GB" dirty="0" smtClean="0"/>
-              <a:t>Overall Summary</a:t>
-            </a:r>
-            <a:endParaRPr lang="en-GB" dirty="0"/>
-          </a:p>
-        </p:txBody>
-      </p:sp>
-      <p:sp>
-        <p:nvSpPr>
-          <p:cNvPr id="3" name="Content Placeholder 2"/>
-          <p:cNvSpPr>
-            <a:spLocks noGrp="1"/>
-          </p:cNvSpPr>
-          <p:nvPr>
-            <p:ph idx="1"/>
-          </p:nvPr>
-        </p:nvSpPr>
-        <p:spPr/>
-        <p:txBody>
-          <a:bodyPr>
-            <a:normAutofit lnSpcReduction="10000"/>
-          </a:bodyPr>
-          <a:lstStyle/>
-          <a:p>
-            <a:r>
-              <a:rPr lang="en-GB" dirty="0" smtClean="0"/>
-              <a:t>Life Expectancy Trends:</a:t>
-            </a:r>
-          </a:p>
-          <a:p>
-            <a:pPr lvl="1"/>
-            <a:r>
-              <a:rPr lang="en-GB" dirty="0" smtClean="0"/>
-              <a:t>Assumption of linear improvements OK</a:t>
-            </a:r>
-          </a:p>
-          <a:p>
-            <a:pPr lvl="2"/>
-            <a:r>
-              <a:rPr lang="en-GB" dirty="0" smtClean="0"/>
-              <a:t>Lee 2002 response to White 2002</a:t>
-            </a:r>
-          </a:p>
-          <a:p>
-            <a:pPr lvl="1"/>
-            <a:r>
-              <a:rPr lang="en-GB" dirty="0" smtClean="0"/>
-              <a:t>Can also use standard deviation of annual change in life expectancy to set thresholds for what counts as an ‘unusual’ year or group of years</a:t>
-            </a:r>
-          </a:p>
-          <a:p>
-            <a:pPr lvl="1"/>
-            <a:r>
-              <a:rPr lang="en-GB" dirty="0" smtClean="0"/>
-              <a:t>UK’s relative position</a:t>
-            </a:r>
-          </a:p>
-          <a:p>
-            <a:pPr lvl="2"/>
-            <a:r>
-              <a:rPr lang="en-GB" dirty="0" smtClean="0"/>
-              <a:t>Fell in 60s; converging in 90s-2000s; fell back again after 2012</a:t>
-            </a:r>
-          </a:p>
-          <a:p>
-            <a:r>
-              <a:rPr lang="en-GB" dirty="0" smtClean="0"/>
-              <a:t>Slowdown in improvement</a:t>
-            </a:r>
-          </a:p>
-          <a:p>
-            <a:pPr lvl="1"/>
-            <a:r>
-              <a:rPr lang="en-GB" dirty="0" smtClean="0"/>
-              <a:t>A slowdown in the slowdown: converging to ~1.5 years gain/decade (0.15 years/year)</a:t>
-            </a:r>
-          </a:p>
-          <a:p>
-            <a:pPr lvl="1"/>
-            <a:r>
-              <a:rPr lang="en-GB" dirty="0" smtClean="0"/>
-              <a:t>UK’s fall in relative position, and improvements at below 0.15 years /year, mean long-term secular declines in improvement </a:t>
-            </a:r>
-            <a:r>
-              <a:rPr lang="en-GB" u="sng" dirty="0" smtClean="0">
-                <a:solidFill>
-                  <a:srgbClr val="C00000"/>
-                </a:solidFill>
-              </a:rPr>
-              <a:t>do not explain </a:t>
-            </a:r>
-            <a:r>
-              <a:rPr lang="en-GB" dirty="0" smtClean="0"/>
-              <a:t>UK’s recent slowdown.</a:t>
-            </a:r>
-            <a:endParaRPr lang="en-GB" dirty="0"/>
+              <a:rPr lang="en-GB" dirty="0"/>
+              <a:t>Supplementary Material</a:t>
+            </a:r>
+          </a:p>
+        </p:txBody>
+      </p:sp>
+      <p:sp>
+        <p:nvSpPr>
+          <p:cNvPr id="3" name="Text Placeholder 2">
+            <a:extLst>
+              <a:ext uri="{FF2B5EF4-FFF2-40B4-BE49-F238E27FC236}">
+                <a16:creationId xmlns:a16="http://schemas.microsoft.com/office/drawing/2014/main" id="{D53B91B1-7963-4FA0-AD19-04897E12B10D}"/>
+              </a:ext>
+            </a:extLst>
+          </p:cNvPr>
+          <p:cNvSpPr>
+            <a:spLocks noGrp="1"/>
+          </p:cNvSpPr>
+          <p:nvPr>
+            <p:ph type="body" idx="1"/>
+          </p:nvPr>
+        </p:nvSpPr>
+        <p:spPr/>
+        <p:txBody>
+          <a:bodyPr/>
+          <a:lstStyle/>
+          <a:p>
+            <a:r>
+              <a:rPr lang="en-GB" dirty="0"/>
+              <a:t>(More </a:t>
+            </a:r>
+            <a:r>
+              <a:rPr lang="en-GB" dirty="0" err="1"/>
+              <a:t>Wonkish</a:t>
+            </a:r>
+            <a:r>
+              <a:rPr lang="en-GB" dirty="0"/>
+              <a:t>)</a:t>
+            </a:r>
           </a:p>
         </p:txBody>
       </p:sp>
     </p:spTree>
     <p:extLst>
       <p:ext uri="{BB962C8B-B14F-4D97-AF65-F5344CB8AC3E}">
-        <p14:creationId xmlns:p14="http://schemas.microsoft.com/office/powerpoint/2010/main" val="398705804"/>
+        <p14:creationId xmlns:p14="http://schemas.microsoft.com/office/powerpoint/2010/main" val="900139653"/>
       </p:ext>
     </p:extLst>
   </p:cSld>
   <p:clrMapOvr>
     <a:masterClrMapping/>
   </p:clrMapOvr>
-  <p:timing>
-    <p:tnLst>
-      <p:par>
-        <p:cTn id="1" dur="indefinite" restart="never" nodeType="tmRoot"/>
-      </p:par>
-    </p:tnLst>
-  </p:timing>
+</p:sld>
+</file>
+
+<file path=ppt/slides/slide18.xml><?xml version="1.0" encoding="utf-8"?>
+<p:sld xmlns:a="http://schemas.openxmlformats.org/drawingml/2006/main" xmlns:r="http://schemas.openxmlformats.org/officeDocument/2006/relationships" xmlns:p="http://schemas.openxmlformats.org/presentationml/2006/main">
+  <p:cSld>
+    <p:spTree>
+      <p:nvGrpSpPr>
+        <p:cNvPr id="1" name=""/>
+        <p:cNvGrpSpPr/>
+        <p:nvPr/>
+      </p:nvGrpSpPr>
+      <p:grpSpPr>
+        <a:xfrm>
+          <a:off x="0" y="0"/>
+          <a:ext cx="0" cy="0"/>
+          <a:chOff x="0" y="0"/>
+          <a:chExt cx="0" cy="0"/>
+        </a:xfrm>
+      </p:grpSpPr>
+      <p:sp>
+        <p:nvSpPr>
+          <p:cNvPr id="2" name="Title 1">
+            <a:extLst>
+              <a:ext uri="{FF2B5EF4-FFF2-40B4-BE49-F238E27FC236}">
+                <a16:creationId xmlns:a16="http://schemas.microsoft.com/office/drawing/2014/main" id="{0C811A4B-5902-4325-BEB3-CAEEF82B4825}"/>
+              </a:ext>
+            </a:extLst>
+          </p:cNvPr>
+          <p:cNvSpPr>
+            <a:spLocks noGrp="1"/>
+          </p:cNvSpPr>
+          <p:nvPr>
+            <p:ph type="title"/>
+          </p:nvPr>
+        </p:nvSpPr>
+        <p:spPr/>
+        <p:txBody>
+          <a:bodyPr/>
+          <a:lstStyle/>
+          <a:p>
+            <a:r>
+              <a:rPr lang="en-GB" dirty="0"/>
+              <a:t>Original with Linear and Nonlinear Smoothers</a:t>
+            </a:r>
+          </a:p>
+        </p:txBody>
+      </p:sp>
+      <p:pic>
+        <p:nvPicPr>
+          <p:cNvPr id="5" name="Content Placeholder 4">
+            <a:extLst>
+              <a:ext uri="{FF2B5EF4-FFF2-40B4-BE49-F238E27FC236}">
+                <a16:creationId xmlns:a16="http://schemas.microsoft.com/office/drawing/2014/main" id="{17AAD95E-DF9A-46D1-886D-721E743C6BC8}"/>
+              </a:ext>
+            </a:extLst>
+          </p:cNvPr>
+          <p:cNvPicPr>
+            <a:picLocks noGrp="1" noChangeAspect="1"/>
+          </p:cNvPicPr>
+          <p:nvPr>
+            <p:ph idx="1"/>
+          </p:nvPr>
+        </p:nvPicPr>
+        <p:blipFill>
+          <a:blip r:embed="rId2" cstate="print">
+            <a:extLst>
+              <a:ext uri="{28A0092B-C50C-407E-A947-70E740481C1C}">
+                <a14:useLocalDpi xmlns:a14="http://schemas.microsoft.com/office/drawing/2010/main" val="0"/>
+              </a:ext>
+            </a:extLst>
+          </a:blip>
+          <a:stretch>
+            <a:fillRect/>
+          </a:stretch>
+        </p:blipFill>
+        <p:spPr>
+          <a:xfrm>
+            <a:off x="2708063" y="1731963"/>
+            <a:ext cx="6766349" cy="4059237"/>
+          </a:xfrm>
+        </p:spPr>
+      </p:pic>
+    </p:spTree>
+    <p:extLst>
+      <p:ext uri="{BB962C8B-B14F-4D97-AF65-F5344CB8AC3E}">
+        <p14:creationId xmlns:p14="http://schemas.microsoft.com/office/powerpoint/2010/main" val="1968900339"/>
+      </p:ext>
+    </p:extLst>
+  </p:cSld>
+  <p:clrMapOvr>
+    <a:masterClrMapping/>
+  </p:clrMapOvr>
+</p:sld>
+</file>
+
+<file path=ppt/slides/slide19.xml><?xml version="1.0" encoding="utf-8"?>
+<p:sld xmlns:a="http://schemas.openxmlformats.org/drawingml/2006/main" xmlns:r="http://schemas.openxmlformats.org/officeDocument/2006/relationships" xmlns:p="http://schemas.openxmlformats.org/presentationml/2006/main">
+  <p:cSld>
+    <p:spTree>
+      <p:nvGrpSpPr>
+        <p:cNvPr id="1" name=""/>
+        <p:cNvGrpSpPr/>
+        <p:nvPr/>
+      </p:nvGrpSpPr>
+      <p:grpSpPr>
+        <a:xfrm>
+          <a:off x="0" y="0"/>
+          <a:ext cx="0" cy="0"/>
+          <a:chOff x="0" y="0"/>
+          <a:chExt cx="0" cy="0"/>
+        </a:xfrm>
+      </p:grpSpPr>
+      <p:sp>
+        <p:nvSpPr>
+          <p:cNvPr id="2" name="Title 1">
+            <a:extLst>
+              <a:ext uri="{FF2B5EF4-FFF2-40B4-BE49-F238E27FC236}">
+                <a16:creationId xmlns:a16="http://schemas.microsoft.com/office/drawing/2014/main" id="{0C811A4B-5902-4325-BEB3-CAEEF82B4825}"/>
+              </a:ext>
+            </a:extLst>
+          </p:cNvPr>
+          <p:cNvSpPr>
+            <a:spLocks noGrp="1"/>
+          </p:cNvSpPr>
+          <p:nvPr>
+            <p:ph type="title"/>
+          </p:nvPr>
+        </p:nvSpPr>
+        <p:spPr/>
+        <p:txBody>
+          <a:bodyPr>
+            <a:normAutofit fontScale="90000"/>
+          </a:bodyPr>
+          <a:lstStyle/>
+          <a:p>
+            <a:r>
+              <a:rPr lang="en-GB" dirty="0"/>
+              <a:t>Updated with Linear and Nonlinear Smoothers</a:t>
+            </a:r>
+          </a:p>
+        </p:txBody>
+      </p:sp>
+      <p:pic>
+        <p:nvPicPr>
+          <p:cNvPr id="5" name="Content Placeholder 4">
+            <a:extLst>
+              <a:ext uri="{FF2B5EF4-FFF2-40B4-BE49-F238E27FC236}">
+                <a16:creationId xmlns:a16="http://schemas.microsoft.com/office/drawing/2014/main" id="{F65A65A0-91C9-4FE4-B8A0-742C09FF292B}"/>
+              </a:ext>
+            </a:extLst>
+          </p:cNvPr>
+          <p:cNvPicPr>
+            <a:picLocks noGrp="1" noChangeAspect="1"/>
+          </p:cNvPicPr>
+          <p:nvPr>
+            <p:ph idx="1"/>
+          </p:nvPr>
+        </p:nvPicPr>
+        <p:blipFill>
+          <a:blip r:embed="rId2" cstate="print">
+            <a:extLst>
+              <a:ext uri="{28A0092B-C50C-407E-A947-70E740481C1C}">
+                <a14:useLocalDpi xmlns:a14="http://schemas.microsoft.com/office/drawing/2010/main" val="0"/>
+              </a:ext>
+            </a:extLst>
+          </a:blip>
+          <a:stretch>
+            <a:fillRect/>
+          </a:stretch>
+        </p:blipFill>
+        <p:spPr>
+          <a:xfrm>
+            <a:off x="2708063" y="1731963"/>
+            <a:ext cx="6766349" cy="4059237"/>
+          </a:xfrm>
+        </p:spPr>
+      </p:pic>
+    </p:spTree>
+    <p:extLst>
+      <p:ext uri="{BB962C8B-B14F-4D97-AF65-F5344CB8AC3E}">
+        <p14:creationId xmlns:p14="http://schemas.microsoft.com/office/powerpoint/2010/main" val="574426683"/>
+      </p:ext>
+    </p:extLst>
+  </p:cSld>
+  <p:clrMapOvr>
+    <a:masterClrMapping/>
+  </p:clrMapOvr>
 </p:sld>
 </file>
 
@@ -6941,10 +7203,9 @@
           <a:lstStyle/>
           <a:p>
             <a:r>
-              <a:rPr lang="en-GB" dirty="0" smtClean="0"/>
+              <a:rPr lang="en-GB" dirty="0"/>
               <a:t>Background</a:t>
             </a:r>
-            <a:endParaRPr lang="en-GB" dirty="0"/>
           </a:p>
         </p:txBody>
       </p:sp>
@@ -6964,39 +7225,39 @@
           <a:lstStyle/>
           <a:p>
             <a:r>
-              <a:rPr lang="en-GB" dirty="0" smtClean="0"/>
+              <a:rPr lang="en-GB" dirty="0"/>
               <a:t>Recent slowdown in life expectancy improvement in UK</a:t>
             </a:r>
           </a:p>
           <a:p>
             <a:r>
-              <a:rPr lang="en-GB" dirty="0" smtClean="0"/>
+              <a:rPr lang="en-GB" dirty="0"/>
               <a:t>Life expectancies have kept improving in high income countries for decades</a:t>
             </a:r>
           </a:p>
           <a:p>
             <a:r>
-              <a:rPr lang="en-GB" dirty="0" smtClean="0"/>
+              <a:rPr lang="en-GB" dirty="0"/>
               <a:t>Intuitive assumption: as life expectancy increases, further gains in life expectancy become ever harder to achieve</a:t>
             </a:r>
           </a:p>
           <a:p>
             <a:r>
-              <a:rPr lang="en-GB" dirty="0" smtClean="0"/>
+              <a:rPr lang="en-GB" dirty="0"/>
               <a:t>Twin phenomena:</a:t>
             </a:r>
           </a:p>
           <a:p>
             <a:pPr lvl="1"/>
             <a:r>
-              <a:rPr lang="en-GB" dirty="0" smtClean="0"/>
+              <a:rPr lang="en-GB" dirty="0"/>
               <a:t>Long-term improvements</a:t>
             </a:r>
           </a:p>
           <a:p>
             <a:pPr lvl="1"/>
             <a:r>
-              <a:rPr lang="en-GB" dirty="0" smtClean="0"/>
+              <a:rPr lang="en-GB" dirty="0"/>
               <a:t>Tendency for improvements to slow down over time</a:t>
             </a:r>
           </a:p>
@@ -7015,13 +7276,486 @@
   <p:clrMapOvr>
     <a:masterClrMapping/>
   </p:clrMapOvr>
-  <p:timing>
-    <p:tnLst>
-      <p:par>
-        <p:cTn id="1" dur="indefinite" restart="never" nodeType="tmRoot"/>
-      </p:par>
-    </p:tnLst>
-  </p:timing>
+</p:sld>
+</file>
+
+<file path=ppt/slides/slide20.xml><?xml version="1.0" encoding="utf-8"?>
+<p:sld xmlns:a="http://schemas.openxmlformats.org/drawingml/2006/main" xmlns:r="http://schemas.openxmlformats.org/officeDocument/2006/relationships" xmlns:p="http://schemas.openxmlformats.org/presentationml/2006/main">
+  <p:cSld>
+    <p:spTree>
+      <p:nvGrpSpPr>
+        <p:cNvPr id="1" name=""/>
+        <p:cNvGrpSpPr/>
+        <p:nvPr/>
+      </p:nvGrpSpPr>
+      <p:grpSpPr>
+        <a:xfrm>
+          <a:off x="0" y="0"/>
+          <a:ext cx="0" cy="0"/>
+          <a:chOff x="0" y="0"/>
+          <a:chExt cx="0" cy="0"/>
+        </a:xfrm>
+      </p:grpSpPr>
+      <p:sp>
+        <p:nvSpPr>
+          <p:cNvPr id="2" name="Title 1">
+            <a:extLst>
+              <a:ext uri="{FF2B5EF4-FFF2-40B4-BE49-F238E27FC236}">
+                <a16:creationId xmlns:a16="http://schemas.microsoft.com/office/drawing/2014/main" id="{EA5520CF-100B-4C91-A72C-CA346D8A2520}"/>
+              </a:ext>
+            </a:extLst>
+          </p:cNvPr>
+          <p:cNvSpPr>
+            <a:spLocks noGrp="1"/>
+          </p:cNvSpPr>
+          <p:nvPr>
+            <p:ph type="title"/>
+          </p:nvPr>
+        </p:nvSpPr>
+        <p:spPr/>
+        <p:txBody>
+          <a:bodyPr>
+            <a:normAutofit fontScale="90000"/>
+          </a:bodyPr>
+          <a:lstStyle/>
+          <a:p>
+            <a:r>
+              <a:rPr lang="en-GB" dirty="0"/>
+              <a:t>Average high income countries, change over time</a:t>
+            </a:r>
+          </a:p>
+        </p:txBody>
+      </p:sp>
+      <p:pic>
+        <p:nvPicPr>
+          <p:cNvPr id="5" name="Content Placeholder 4">
+            <a:extLst>
+              <a:ext uri="{FF2B5EF4-FFF2-40B4-BE49-F238E27FC236}">
+                <a16:creationId xmlns:a16="http://schemas.microsoft.com/office/drawing/2014/main" id="{F21F461C-3AF8-4FFB-91AB-A5F05C13F9A0}"/>
+              </a:ext>
+            </a:extLst>
+          </p:cNvPr>
+          <p:cNvPicPr>
+            <a:picLocks noGrp="1" noChangeAspect="1"/>
+          </p:cNvPicPr>
+          <p:nvPr>
+            <p:ph idx="1"/>
+          </p:nvPr>
+        </p:nvPicPr>
+        <p:blipFill>
+          <a:blip r:embed="rId2" cstate="print">
+            <a:extLst>
+              <a:ext uri="{28A0092B-C50C-407E-A947-70E740481C1C}">
+                <a14:useLocalDpi xmlns:a14="http://schemas.microsoft.com/office/drawing/2010/main" val="0"/>
+              </a:ext>
+            </a:extLst>
+          </a:blip>
+          <a:stretch>
+            <a:fillRect/>
+          </a:stretch>
+        </p:blipFill>
+        <p:spPr>
+          <a:xfrm>
+            <a:off x="1185491" y="1731963"/>
+            <a:ext cx="9811493" cy="4059237"/>
+          </a:xfrm>
+        </p:spPr>
+      </p:pic>
+    </p:spTree>
+    <p:extLst>
+      <p:ext uri="{BB962C8B-B14F-4D97-AF65-F5344CB8AC3E}">
+        <p14:creationId xmlns:p14="http://schemas.microsoft.com/office/powerpoint/2010/main" val="4145569656"/>
+      </p:ext>
+    </p:extLst>
+  </p:cSld>
+  <p:clrMapOvr>
+    <a:masterClrMapping/>
+  </p:clrMapOvr>
+</p:sld>
+</file>
+
+<file path=ppt/slides/slide21.xml><?xml version="1.0" encoding="utf-8"?>
+<p:sld xmlns:a="http://schemas.openxmlformats.org/drawingml/2006/main" xmlns:r="http://schemas.openxmlformats.org/officeDocument/2006/relationships" xmlns:p="http://schemas.openxmlformats.org/presentationml/2006/main">
+  <p:cSld>
+    <p:spTree>
+      <p:nvGrpSpPr>
+        <p:cNvPr id="1" name=""/>
+        <p:cNvGrpSpPr/>
+        <p:nvPr/>
+      </p:nvGrpSpPr>
+      <p:grpSpPr>
+        <a:xfrm>
+          <a:off x="0" y="0"/>
+          <a:ext cx="0" cy="0"/>
+          <a:chOff x="0" y="0"/>
+          <a:chExt cx="0" cy="0"/>
+        </a:xfrm>
+      </p:grpSpPr>
+      <p:sp>
+        <p:nvSpPr>
+          <p:cNvPr id="2" name="Title 1">
+            <a:extLst>
+              <a:ext uri="{FF2B5EF4-FFF2-40B4-BE49-F238E27FC236}">
+                <a16:creationId xmlns:a16="http://schemas.microsoft.com/office/drawing/2014/main" id="{0C811A4B-5902-4325-BEB3-CAEEF82B4825}"/>
+              </a:ext>
+            </a:extLst>
+          </p:cNvPr>
+          <p:cNvSpPr>
+            <a:spLocks noGrp="1"/>
+          </p:cNvSpPr>
+          <p:nvPr>
+            <p:ph type="title"/>
+          </p:nvPr>
+        </p:nvSpPr>
+        <p:spPr/>
+        <p:txBody>
+          <a:bodyPr>
+            <a:normAutofit fontScale="90000"/>
+          </a:bodyPr>
+          <a:lstStyle/>
+          <a:p>
+            <a:r>
+              <a:rPr lang="en-GB" dirty="0"/>
+              <a:t>Average high income, change over time,</a:t>
+            </a:r>
+            <a:br>
+              <a:rPr lang="en-GB" dirty="0"/>
+            </a:br>
+            <a:r>
+              <a:rPr lang="en-GB" dirty="0"/>
+              <a:t>with bars at 0.5 SD intervals</a:t>
+            </a:r>
+          </a:p>
+        </p:txBody>
+      </p:sp>
+      <p:pic>
+        <p:nvPicPr>
+          <p:cNvPr id="5" name="Content Placeholder 4">
+            <a:extLst>
+              <a:ext uri="{FF2B5EF4-FFF2-40B4-BE49-F238E27FC236}">
+                <a16:creationId xmlns:a16="http://schemas.microsoft.com/office/drawing/2014/main" id="{4FCA7B60-708F-476F-9FDA-89306DCE4FE6}"/>
+              </a:ext>
+            </a:extLst>
+          </p:cNvPr>
+          <p:cNvPicPr>
+            <a:picLocks noGrp="1" noChangeAspect="1"/>
+          </p:cNvPicPr>
+          <p:nvPr>
+            <p:ph idx="1"/>
+          </p:nvPr>
+        </p:nvPicPr>
+        <p:blipFill>
+          <a:blip r:embed="rId2" cstate="print">
+            <a:extLst>
+              <a:ext uri="{28A0092B-C50C-407E-A947-70E740481C1C}">
+                <a14:useLocalDpi xmlns:a14="http://schemas.microsoft.com/office/drawing/2010/main" val="0"/>
+              </a:ext>
+            </a:extLst>
+          </a:blip>
+          <a:stretch>
+            <a:fillRect/>
+          </a:stretch>
+        </p:blipFill>
+        <p:spPr>
+          <a:xfrm>
+            <a:off x="1185491" y="1731963"/>
+            <a:ext cx="9811493" cy="4059237"/>
+          </a:xfrm>
+        </p:spPr>
+      </p:pic>
+    </p:spTree>
+    <p:extLst>
+      <p:ext uri="{BB962C8B-B14F-4D97-AF65-F5344CB8AC3E}">
+        <p14:creationId xmlns:p14="http://schemas.microsoft.com/office/powerpoint/2010/main" val="2187872349"/>
+      </p:ext>
+    </p:extLst>
+  </p:cSld>
+  <p:clrMapOvr>
+    <a:masterClrMapping/>
+  </p:clrMapOvr>
+</p:sld>
+</file>
+
+<file path=ppt/slides/slide22.xml><?xml version="1.0" encoding="utf-8"?>
+<p:sld xmlns:a="http://schemas.openxmlformats.org/drawingml/2006/main" xmlns:r="http://schemas.openxmlformats.org/officeDocument/2006/relationships" xmlns:p="http://schemas.openxmlformats.org/presentationml/2006/main">
+  <p:cSld>
+    <p:spTree>
+      <p:nvGrpSpPr>
+        <p:cNvPr id="1" name=""/>
+        <p:cNvGrpSpPr/>
+        <p:nvPr/>
+      </p:nvGrpSpPr>
+      <p:grpSpPr>
+        <a:xfrm>
+          <a:off x="0" y="0"/>
+          <a:ext cx="0" cy="0"/>
+          <a:chOff x="0" y="0"/>
+          <a:chExt cx="0" cy="0"/>
+        </a:xfrm>
+      </p:grpSpPr>
+      <p:sp>
+        <p:nvSpPr>
+          <p:cNvPr id="2" name="Title 1">
+            <a:extLst>
+              <a:ext uri="{FF2B5EF4-FFF2-40B4-BE49-F238E27FC236}">
+                <a16:creationId xmlns:a16="http://schemas.microsoft.com/office/drawing/2014/main" id="{D5058C27-BABE-45B9-AA93-956C584BD0BC}"/>
+              </a:ext>
+            </a:extLst>
+          </p:cNvPr>
+          <p:cNvSpPr>
+            <a:spLocks noGrp="1"/>
+          </p:cNvSpPr>
+          <p:nvPr>
+            <p:ph type="title"/>
+          </p:nvPr>
+        </p:nvSpPr>
+        <p:spPr/>
+        <p:txBody>
+          <a:bodyPr>
+            <a:normAutofit fontScale="90000"/>
+          </a:bodyPr>
+          <a:lstStyle/>
+          <a:p>
+            <a:r>
+              <a:rPr lang="en-GB" dirty="0"/>
+              <a:t>Change over time, UK compared with average high income countries</a:t>
+            </a:r>
+          </a:p>
+        </p:txBody>
+      </p:sp>
+      <p:pic>
+        <p:nvPicPr>
+          <p:cNvPr id="5" name="Content Placeholder 4">
+            <a:extLst>
+              <a:ext uri="{FF2B5EF4-FFF2-40B4-BE49-F238E27FC236}">
+                <a16:creationId xmlns:a16="http://schemas.microsoft.com/office/drawing/2014/main" id="{B7D07696-38C2-420A-A016-F4AFF3041FF5}"/>
+              </a:ext>
+            </a:extLst>
+          </p:cNvPr>
+          <p:cNvPicPr>
+            <a:picLocks noGrp="1" noChangeAspect="1"/>
+          </p:cNvPicPr>
+          <p:nvPr>
+            <p:ph idx="1"/>
+          </p:nvPr>
+        </p:nvPicPr>
+        <p:blipFill>
+          <a:blip r:embed="rId2" cstate="print">
+            <a:extLst>
+              <a:ext uri="{28A0092B-C50C-407E-A947-70E740481C1C}">
+                <a14:useLocalDpi xmlns:a14="http://schemas.microsoft.com/office/drawing/2010/main" val="0"/>
+              </a:ext>
+            </a:extLst>
+          </a:blip>
+          <a:stretch>
+            <a:fillRect/>
+          </a:stretch>
+        </p:blipFill>
+        <p:spPr>
+          <a:xfrm>
+            <a:off x="1185491" y="1731963"/>
+            <a:ext cx="9811493" cy="4059237"/>
+          </a:xfrm>
+        </p:spPr>
+      </p:pic>
+    </p:spTree>
+    <p:extLst>
+      <p:ext uri="{BB962C8B-B14F-4D97-AF65-F5344CB8AC3E}">
+        <p14:creationId xmlns:p14="http://schemas.microsoft.com/office/powerpoint/2010/main" val="3478149052"/>
+      </p:ext>
+    </p:extLst>
+  </p:cSld>
+  <p:clrMapOvr>
+    <a:masterClrMapping/>
+  </p:clrMapOvr>
+</p:sld>
+</file>
+
+<file path=ppt/slides/slide23.xml><?xml version="1.0" encoding="utf-8"?>
+<p:sld xmlns:a="http://schemas.openxmlformats.org/drawingml/2006/main" xmlns:r="http://schemas.openxmlformats.org/officeDocument/2006/relationships" xmlns:p="http://schemas.openxmlformats.org/presentationml/2006/main">
+  <p:cSld>
+    <p:spTree>
+      <p:nvGrpSpPr>
+        <p:cNvPr id="1" name=""/>
+        <p:cNvGrpSpPr/>
+        <p:nvPr/>
+      </p:nvGrpSpPr>
+      <p:grpSpPr>
+        <a:xfrm>
+          <a:off x="0" y="0"/>
+          <a:ext cx="0" cy="0"/>
+          <a:chOff x="0" y="0"/>
+          <a:chExt cx="0" cy="0"/>
+        </a:xfrm>
+      </p:grpSpPr>
+      <p:sp>
+        <p:nvSpPr>
+          <p:cNvPr id="2" name="Title 1">
+            <a:extLst>
+              <a:ext uri="{FF2B5EF4-FFF2-40B4-BE49-F238E27FC236}">
+                <a16:creationId xmlns:a16="http://schemas.microsoft.com/office/drawing/2014/main" id="{ED005875-0526-4C80-8900-31F2E83CB553}"/>
+              </a:ext>
+            </a:extLst>
+          </p:cNvPr>
+          <p:cNvSpPr>
+            <a:spLocks noGrp="1"/>
+          </p:cNvSpPr>
+          <p:nvPr>
+            <p:ph type="title"/>
+          </p:nvPr>
+        </p:nvSpPr>
+        <p:spPr/>
+        <p:txBody>
+          <a:bodyPr/>
+          <a:lstStyle/>
+          <a:p>
+            <a:r>
+              <a:rPr lang="en-GB" dirty="0"/>
+              <a:t>Change over time, UK</a:t>
+            </a:r>
+          </a:p>
+        </p:txBody>
+      </p:sp>
+      <p:pic>
+        <p:nvPicPr>
+          <p:cNvPr id="5" name="Content Placeholder 4">
+            <a:extLst>
+              <a:ext uri="{FF2B5EF4-FFF2-40B4-BE49-F238E27FC236}">
+                <a16:creationId xmlns:a16="http://schemas.microsoft.com/office/drawing/2014/main" id="{B71D29A3-ACE4-4EDF-BA56-03C3556B210A}"/>
+              </a:ext>
+            </a:extLst>
+          </p:cNvPr>
+          <p:cNvPicPr>
+            <a:picLocks noGrp="1" noChangeAspect="1"/>
+          </p:cNvPicPr>
+          <p:nvPr>
+            <p:ph idx="1"/>
+          </p:nvPr>
+        </p:nvPicPr>
+        <p:blipFill>
+          <a:blip r:embed="rId2" cstate="print">
+            <a:extLst>
+              <a:ext uri="{28A0092B-C50C-407E-A947-70E740481C1C}">
+                <a14:useLocalDpi xmlns:a14="http://schemas.microsoft.com/office/drawing/2010/main" val="0"/>
+              </a:ext>
+            </a:extLst>
+          </a:blip>
+          <a:stretch>
+            <a:fillRect/>
+          </a:stretch>
+        </p:blipFill>
+        <p:spPr>
+          <a:xfrm>
+            <a:off x="1185491" y="1731963"/>
+            <a:ext cx="9811493" cy="4059237"/>
+          </a:xfrm>
+        </p:spPr>
+      </p:pic>
+    </p:spTree>
+    <p:extLst>
+      <p:ext uri="{BB962C8B-B14F-4D97-AF65-F5344CB8AC3E}">
+        <p14:creationId xmlns:p14="http://schemas.microsoft.com/office/powerpoint/2010/main" val="2949950449"/>
+      </p:ext>
+    </p:extLst>
+  </p:cSld>
+  <p:clrMapOvr>
+    <a:masterClrMapping/>
+  </p:clrMapOvr>
+</p:sld>
+</file>
+
+<file path=ppt/slides/slide24.xml><?xml version="1.0" encoding="utf-8"?>
+<p:sld xmlns:a="http://schemas.openxmlformats.org/drawingml/2006/main" xmlns:r="http://schemas.openxmlformats.org/officeDocument/2006/relationships" xmlns:p="http://schemas.openxmlformats.org/presentationml/2006/main">
+  <p:cSld>
+    <p:spTree>
+      <p:nvGrpSpPr>
+        <p:cNvPr id="1" name=""/>
+        <p:cNvGrpSpPr/>
+        <p:nvPr/>
+      </p:nvGrpSpPr>
+      <p:grpSpPr>
+        <a:xfrm>
+          <a:off x="0" y="0"/>
+          <a:ext cx="0" cy="0"/>
+          <a:chOff x="0" y="0"/>
+          <a:chExt cx="0" cy="0"/>
+        </a:xfrm>
+      </p:grpSpPr>
+      <p:sp>
+        <p:nvSpPr>
+          <p:cNvPr id="2" name="Title 1">
+            <a:extLst>
+              <a:ext uri="{FF2B5EF4-FFF2-40B4-BE49-F238E27FC236}">
+                <a16:creationId xmlns:a16="http://schemas.microsoft.com/office/drawing/2014/main" id="{1C4D27EF-8E74-491B-BC6A-67CBA5C6A141}"/>
+              </a:ext>
+            </a:extLst>
+          </p:cNvPr>
+          <p:cNvSpPr>
+            <a:spLocks noGrp="1"/>
+          </p:cNvSpPr>
+          <p:nvPr>
+            <p:ph type="title"/>
+          </p:nvPr>
+        </p:nvSpPr>
+        <p:spPr/>
+        <p:txBody>
+          <a:bodyPr>
+            <a:normAutofit fontScale="90000"/>
+          </a:bodyPr>
+          <a:lstStyle/>
+          <a:p>
+            <a:r>
+              <a:rPr lang="en-GB" dirty="0"/>
+              <a:t>Change over time, UK, with bars at 0.5 SD intervals</a:t>
+            </a:r>
+          </a:p>
+        </p:txBody>
+      </p:sp>
+      <p:pic>
+        <p:nvPicPr>
+          <p:cNvPr id="5" name="Content Placeholder 4">
+            <a:extLst>
+              <a:ext uri="{FF2B5EF4-FFF2-40B4-BE49-F238E27FC236}">
+                <a16:creationId xmlns:a16="http://schemas.microsoft.com/office/drawing/2014/main" id="{8617974B-33E9-42F6-8412-827B66C7C45C}"/>
+              </a:ext>
+            </a:extLst>
+          </p:cNvPr>
+          <p:cNvPicPr>
+            <a:picLocks noGrp="1" noChangeAspect="1"/>
+          </p:cNvPicPr>
+          <p:nvPr>
+            <p:ph idx="1"/>
+          </p:nvPr>
+        </p:nvPicPr>
+        <p:blipFill>
+          <a:blip r:embed="rId2" cstate="print">
+            <a:extLst>
+              <a:ext uri="{28A0092B-C50C-407E-A947-70E740481C1C}">
+                <a14:useLocalDpi xmlns:a14="http://schemas.microsoft.com/office/drawing/2010/main" val="0"/>
+              </a:ext>
+            </a:extLst>
+          </a:blip>
+          <a:stretch>
+            <a:fillRect/>
+          </a:stretch>
+        </p:blipFill>
+        <p:spPr>
+          <a:xfrm>
+            <a:off x="1185491" y="1731963"/>
+            <a:ext cx="9811493" cy="4059237"/>
+          </a:xfrm>
+        </p:spPr>
+      </p:pic>
+    </p:spTree>
+    <p:extLst>
+      <p:ext uri="{BB962C8B-B14F-4D97-AF65-F5344CB8AC3E}">
+        <p14:creationId xmlns:p14="http://schemas.microsoft.com/office/powerpoint/2010/main" val="499260215"/>
+      </p:ext>
+    </p:extLst>
+  </p:cSld>
+  <p:clrMapOvr>
+    <a:masterClrMapping/>
+  </p:clrMapOvr>
 </p:sld>
 </file>
 
@@ -7058,10 +7792,9 @@
           <a:lstStyle/>
           <a:p>
             <a:r>
-              <a:rPr lang="en-GB" dirty="0" smtClean="0"/>
+              <a:rPr lang="en-GB" dirty="0"/>
               <a:t>Example</a:t>
             </a:r>
-            <a:endParaRPr lang="en-GB" dirty="0"/>
           </a:p>
         </p:txBody>
       </p:sp>
@@ -7086,20 +7819,8 @@
               <a:buNone/>
             </a:pPr>
             <a:r>
-              <a:rPr lang="en-GB" dirty="0" smtClean="0"/>
-              <a:t>“The </a:t>
-            </a:r>
-            <a:r>
               <a:rPr lang="en-GB" dirty="0"/>
-              <a:t>slowdown in UK life expectancy since 2010 appears to have been driven largely by declining improvements in YLL from ischaemic heart disease and stroke, with increasing YLL from lower respiratory tract </a:t>
-            </a:r>
-            <a:r>
-              <a:rPr lang="en-GB" dirty="0" smtClean="0"/>
-              <a:t>infections </a:t>
-            </a:r>
-            <a:r>
-              <a:rPr lang="en-GB" dirty="0"/>
-              <a:t>and cancer also contributing. Further research is needed into the causes of these condition-specific changes, including the effects of austerity and </a:t>
+              <a:t>“The slowdown in UK life expectancy since 2010 appears to have been driven largely by declining improvements in YLL from ischaemic heart disease and stroke, with increasing YLL from lower respiratory tract infections and cancer also contributing. Further research is needed into the causes of these condition-specific changes, including the effects of austerity and </a:t>
             </a:r>
             <a:r>
               <a:rPr lang="en-GB" i="1" dirty="0">
@@ -7115,36 +7836,23 @@
                   <a:srgbClr val="C00000"/>
                 </a:solidFill>
               </a:rPr>
-              <a:t>biologically possible</a:t>
-            </a:r>
-            <a:r>
-              <a:rPr lang="en-GB" i="1" u="sng" dirty="0" smtClean="0">
-                <a:solidFill>
-                  <a:srgbClr val="C00000"/>
-                </a:solidFill>
-              </a:rPr>
-              <a:t>.”</a:t>
-            </a:r>
-            <a:endParaRPr lang="en-GB" i="1" u="sng" dirty="0">
-              <a:solidFill>
-                <a:srgbClr val="C00000"/>
-              </a:solidFill>
-            </a:endParaRPr>
+              <a:t>biologically possible.”</a:t>
+            </a:r>
           </a:p>
           <a:p>
             <a:pPr marL="0" indent="0" algn="r">
               <a:buNone/>
             </a:pPr>
             <a:r>
-              <a:rPr lang="en-GB" sz="1800" b="1" dirty="0" smtClean="0"/>
+              <a:rPr lang="en-GB" sz="1800" b="1" dirty="0"/>
               <a:t>Source</a:t>
             </a:r>
             <a:r>
-              <a:rPr lang="en-GB" sz="1800" dirty="0" smtClean="0"/>
+              <a:rPr lang="en-GB" sz="1800" dirty="0"/>
               <a:t>: Parry, Steel &amp; Ford (2018), “Slowing of life expectancy in the UK: Global Burden of Disease Study 2016”, </a:t>
             </a:r>
             <a:r>
-              <a:rPr lang="en-GB" sz="1800" i="1" dirty="0" smtClean="0"/>
+              <a:rPr lang="en-GB" sz="1800" i="1" dirty="0"/>
               <a:t>Lancet Meeting Abstracts</a:t>
             </a:r>
           </a:p>
@@ -7153,12 +7861,12 @@
               <a:buNone/>
             </a:pPr>
             <a:r>
-              <a:rPr lang="en-GB" sz="1800" dirty="0" smtClean="0">
+              <a:rPr lang="en-GB" sz="1800" dirty="0">
                 <a:hlinkClick r:id="rId2"/>
               </a:rPr>
               <a:t>https://www.thelancet.com/journals/lancet/article/PIIS0140-6736(18)32906-4/fulltext</a:t>
             </a:r>
-            <a:endParaRPr lang="en-GB" sz="1800" dirty="0" smtClean="0"/>
+            <a:endParaRPr lang="en-GB" sz="1800" dirty="0"/>
           </a:p>
           <a:p>
             <a:pPr marL="0" indent="0">
@@ -7178,13 +7886,6 @@
   <p:clrMapOvr>
     <a:masterClrMapping/>
   </p:clrMapOvr>
-  <p:timing>
-    <p:tnLst>
-      <p:par>
-        <p:cTn id="1" dur="indefinite" restart="never" nodeType="tmRoot"/>
-      </p:par>
-    </p:tnLst>
-  </p:timing>
 </p:sld>
 </file>
 
@@ -7221,10 +7922,9 @@
           <a:lstStyle/>
           <a:p>
             <a:r>
-              <a:rPr lang="en-GB" dirty="0" smtClean="0"/>
+              <a:rPr lang="en-GB" dirty="0"/>
               <a:t>Questions</a:t>
             </a:r>
-            <a:endParaRPr lang="en-GB" dirty="0"/>
           </a:p>
         </p:txBody>
       </p:sp>
@@ -7244,16 +7944,15 @@
           <a:lstStyle/>
           <a:p>
             <a:r>
-              <a:rPr lang="en-GB" dirty="0" smtClean="0"/>
+              <a:rPr lang="en-GB" dirty="0"/>
               <a:t>Is are these twin phenomena – gains and slowdowns – ‘true’ (for now)?</a:t>
             </a:r>
           </a:p>
           <a:p>
             <a:r>
-              <a:rPr lang="en-GB" dirty="0" smtClean="0"/>
+              <a:rPr lang="en-GB" dirty="0"/>
               <a:t>Do any general tendencies towards slowdown explain recent slowdown/decline in UK?</a:t>
             </a:r>
-            <a:endParaRPr lang="en-GB" dirty="0"/>
           </a:p>
         </p:txBody>
       </p:sp>
@@ -7267,13 +7966,6 @@
   <p:clrMapOvr>
     <a:masterClrMapping/>
   </p:clrMapOvr>
-  <p:timing>
-    <p:tnLst>
-      <p:par>
-        <p:cTn id="1" dur="indefinite" restart="never" nodeType="tmRoot"/>
-      </p:par>
-    </p:tnLst>
-  </p:timing>
 </p:sld>
 </file>
 
@@ -7310,76 +8002,74 @@
           <a:lstStyle/>
           <a:p>
             <a:r>
-              <a:rPr lang="en-GB" dirty="0" smtClean="0"/>
+              <a:rPr lang="en-GB" dirty="0"/>
               <a:t>Approach</a:t>
             </a:r>
+          </a:p>
+        </p:txBody>
+      </p:sp>
+      <p:sp>
+        <p:nvSpPr>
+          <p:cNvPr id="3" name="Content Placeholder 2"/>
+          <p:cNvSpPr>
+            <a:spLocks noGrp="1"/>
+          </p:cNvSpPr>
+          <p:nvPr>
+            <p:ph idx="1"/>
+          </p:nvPr>
+        </p:nvSpPr>
+        <p:spPr/>
+        <p:txBody>
+          <a:bodyPr/>
+          <a:lstStyle/>
+          <a:p>
+            <a:r>
+              <a:rPr lang="en-GB" dirty="0"/>
+              <a:t>Review/summarise two key empirical findings on</a:t>
+            </a:r>
+          </a:p>
+          <a:p>
+            <a:pPr lvl="1"/>
+            <a:r>
+              <a:rPr lang="en-GB" dirty="0"/>
+              <a:t>Life expectancy trends</a:t>
+            </a:r>
+          </a:p>
+          <a:p>
+            <a:pPr lvl="1"/>
+            <a:r>
+              <a:rPr lang="en-GB" dirty="0"/>
+              <a:t>Life expectancy slowdown</a:t>
+            </a:r>
+          </a:p>
+          <a:p>
+            <a:r>
+              <a:rPr lang="en-GB" dirty="0"/>
+              <a:t>As long-term, predictable, international phenomena</a:t>
+            </a:r>
+          </a:p>
+          <a:p>
             <a:endParaRPr lang="en-GB" dirty="0"/>
           </a:p>
-        </p:txBody>
-      </p:sp>
-      <p:sp>
-        <p:nvSpPr>
-          <p:cNvPr id="3" name="Content Placeholder 2"/>
-          <p:cNvSpPr>
-            <a:spLocks noGrp="1"/>
-          </p:cNvSpPr>
-          <p:nvPr>
-            <p:ph idx="1"/>
-          </p:nvPr>
-        </p:nvSpPr>
-        <p:spPr/>
-        <p:txBody>
-          <a:bodyPr/>
-          <a:lstStyle/>
-          <a:p>
-            <a:r>
-              <a:rPr lang="en-GB" dirty="0" smtClean="0"/>
-              <a:t>Review/summarise two key empirical findings on</a:t>
+          <a:p>
+            <a:r>
+              <a:rPr lang="en-GB" dirty="0"/>
+              <a:t>Repurpose the above analysis to explore:</a:t>
             </a:r>
           </a:p>
           <a:p>
             <a:pPr lvl="1"/>
             <a:r>
-              <a:rPr lang="en-GB" dirty="0" smtClean="0"/>
-              <a:t>Life expectancy trends</a:t>
+              <a:rPr lang="en-GB" dirty="0"/>
+              <a:t>How the UK compares against other high income countries</a:t>
             </a:r>
           </a:p>
           <a:p>
             <a:pPr lvl="1"/>
             <a:r>
-              <a:rPr lang="en-GB" dirty="0" smtClean="0"/>
-              <a:t>Life expectancy slowdown</a:t>
-            </a:r>
-          </a:p>
-          <a:p>
-            <a:r>
-              <a:rPr lang="en-GB" dirty="0" smtClean="0"/>
-              <a:t>As long-term, predictable, international phenomena</a:t>
-            </a:r>
-          </a:p>
-          <a:p>
-            <a:endParaRPr lang="en-GB" dirty="0"/>
-          </a:p>
-          <a:p>
-            <a:r>
-              <a:rPr lang="en-GB" dirty="0" smtClean="0"/>
-              <a:t>Repurpose the above analysis to explore:</a:t>
-            </a:r>
-          </a:p>
-          <a:p>
-            <a:pPr lvl="1"/>
-            <a:r>
-              <a:rPr lang="en-GB" dirty="0" smtClean="0"/>
-              <a:t>How the UK compares against other high income countries</a:t>
-            </a:r>
-          </a:p>
-          <a:p>
-            <a:pPr lvl="1"/>
-            <a:r>
-              <a:rPr lang="en-GB" dirty="0" smtClean="0"/>
+              <a:rPr lang="en-GB" dirty="0"/>
               <a:t>Whether long-term, international tendencies towards slowdown explain the recent slowdown in the UK</a:t>
             </a:r>
-            <a:endParaRPr lang="en-GB" dirty="0"/>
           </a:p>
         </p:txBody>
       </p:sp>
@@ -7393,13 +8083,6 @@
   <p:clrMapOvr>
     <a:masterClrMapping/>
   </p:clrMapOvr>
-  <p:timing>
-    <p:tnLst>
-      <p:par>
-        <p:cTn id="1" dur="indefinite" restart="never" nodeType="tmRoot"/>
-      </p:par>
-    </p:tnLst>
-  </p:timing>
 </p:sld>
 </file>
 
@@ -7436,10 +8119,9 @@
           <a:lstStyle/>
           <a:p>
             <a:r>
-              <a:rPr lang="en-GB" dirty="0" smtClean="0"/>
+              <a:rPr lang="en-GB" dirty="0"/>
               <a:t>The Keystone paper: White (2002)</a:t>
             </a:r>
-            <a:endParaRPr lang="en-GB" dirty="0"/>
           </a:p>
         </p:txBody>
       </p:sp>
@@ -7464,25 +8146,7 @@
               <a:rPr lang="en-GB" dirty="0">
                 <a:hlinkClick r:id="rId2"/>
               </a:rPr>
-              <a:t>White, K.M. 2002. </a:t>
-            </a:r>
-            <a:r>
-              <a:rPr lang="en-GB" dirty="0" smtClean="0">
-                <a:hlinkClick r:id="rId2"/>
-              </a:rPr>
-              <a:t>“Longevity </a:t>
-            </a:r>
-            <a:r>
-              <a:rPr lang="en-GB" dirty="0">
-                <a:hlinkClick r:id="rId2"/>
-              </a:rPr>
-              <a:t>Advances in High-Income Countries, 1955-96</a:t>
-            </a:r>
-            <a:r>
-              <a:rPr lang="en-GB" dirty="0" smtClean="0">
-                <a:hlinkClick r:id="rId2"/>
-              </a:rPr>
-              <a:t>.” </a:t>
+              <a:t>White, K.M. 2002. “Longevity Advances in High-Income Countries, 1955-96.” </a:t>
             </a:r>
             <a:r>
               <a:rPr lang="en-GB" i="1" dirty="0">
@@ -7494,29 +8158,23 @@
               <a:rPr lang="en-GB" dirty="0">
                 <a:hlinkClick r:id="rId2"/>
               </a:rPr>
-              <a:t> 28(1), pp. 59–76</a:t>
-            </a:r>
-            <a:r>
-              <a:rPr lang="en-GB" dirty="0" smtClean="0">
-                <a:hlinkClick r:id="rId2"/>
-              </a:rPr>
-              <a:t>.</a:t>
-            </a:r>
-            <a:endParaRPr lang="en-GB" dirty="0" smtClean="0"/>
-          </a:p>
-          <a:p>
+              <a:t> 28(1), pp. 59–76.</a:t>
+            </a:r>
             <a:endParaRPr lang="en-GB" dirty="0"/>
           </a:p>
           <a:p>
+            <a:endParaRPr lang="en-GB" dirty="0"/>
+          </a:p>
+          <a:p>
             <a:pPr marL="0" indent="0" algn="just">
               <a:buNone/>
             </a:pPr>
             <a:r>
-              <a:rPr lang="en-GB" b="1" dirty="0" smtClean="0"/>
+              <a:rPr lang="en-GB" b="1" dirty="0"/>
               <a:t>Abstract</a:t>
             </a:r>
             <a:r>
-              <a:rPr lang="en-GB" dirty="0" smtClean="0"/>
+              <a:rPr lang="en-GB" dirty="0"/>
               <a:t>:</a:t>
             </a:r>
           </a:p>
@@ -7524,21 +8182,13 @@
             <a:pPr marL="0" indent="0" algn="just">
               <a:buNone/>
             </a:pPr>
-            <a:r>
-              <a:rPr lang="en-GB" dirty="0" smtClean="0">
-                <a:solidFill>
-                  <a:schemeClr val="accent1"/>
-                </a:solidFill>
-              </a:rPr>
-              <a:t>The </a:t>
-            </a:r>
             <a:r>
               <a:rPr lang="en-GB" dirty="0">
                 <a:solidFill>
                   <a:schemeClr val="accent1"/>
                 </a:solidFill>
               </a:rPr>
-              <a:t>advance of life expectancy within high‐income countries from 1955 to 1996 is well represented by a straight‐line trend. </a:t>
+              <a:t>The advance of life expectancy within high‐income countries from 1955 to 1996 is well represented by a straight‐line trend. </a:t>
             </a:r>
             <a:r>
               <a:rPr lang="en-GB" dirty="0"/>
@@ -7565,13 +8215,6 @@
   <p:clrMapOvr>
     <a:masterClrMapping/>
   </p:clrMapOvr>
-  <p:timing>
-    <p:tnLst>
-      <p:par>
-        <p:cTn id="1" dur="indefinite" restart="never" nodeType="tmRoot"/>
-      </p:par>
-    </p:tnLst>
-  </p:timing>
 </p:sld>
 </file>
 
@@ -7610,98 +8253,95 @@
           <a:lstStyle/>
           <a:p>
             <a:r>
-              <a:rPr lang="en-GB" dirty="0" smtClean="0"/>
+              <a:rPr lang="en-GB" dirty="0"/>
               <a:t>First Claim: Life Expectancy Improvements are Linear</a:t>
             </a:r>
+          </a:p>
+        </p:txBody>
+      </p:sp>
+      <p:sp>
+        <p:nvSpPr>
+          <p:cNvPr id="3" name="Content Placeholder 2"/>
+          <p:cNvSpPr>
+            <a:spLocks noGrp="1"/>
+          </p:cNvSpPr>
+          <p:nvPr>
+            <p:ph idx="1"/>
+          </p:nvPr>
+        </p:nvSpPr>
+        <p:spPr/>
+        <p:txBody>
+          <a:bodyPr/>
+          <a:lstStyle/>
+          <a:p>
+            <a:r>
+              <a:rPr lang="en-GB" dirty="0"/>
+              <a:t>Data:</a:t>
+            </a:r>
+          </a:p>
+          <a:p>
+            <a:pPr lvl="1"/>
+            <a:r>
+              <a:rPr lang="en-GB" dirty="0"/>
+              <a:t>Unweighted average of 21 high income countries (including UK as one country)</a:t>
+            </a:r>
+          </a:p>
+          <a:p>
+            <a:pPr lvl="1"/>
+            <a:r>
+              <a:rPr lang="en-GB" dirty="0"/>
+              <a:t>From 1955 to 1996</a:t>
+            </a:r>
+          </a:p>
+          <a:p>
+            <a:pPr lvl="1"/>
+            <a:r>
+              <a:rPr lang="en-GB" b="1" dirty="0"/>
+              <a:t>Source</a:t>
+            </a:r>
+            <a:r>
+              <a:rPr lang="en-GB" dirty="0"/>
+              <a:t>: Human Mortality Database</a:t>
+            </a:r>
+          </a:p>
+          <a:p>
+            <a:pPr lvl="1"/>
             <a:endParaRPr lang="en-GB" dirty="0"/>
           </a:p>
-        </p:txBody>
-      </p:sp>
-      <p:sp>
-        <p:nvSpPr>
-          <p:cNvPr id="3" name="Content Placeholder 2"/>
-          <p:cNvSpPr>
-            <a:spLocks noGrp="1"/>
-          </p:cNvSpPr>
-          <p:nvPr>
-            <p:ph idx="1"/>
-          </p:nvPr>
-        </p:nvSpPr>
-        <p:spPr/>
-        <p:txBody>
-          <a:bodyPr/>
-          <a:lstStyle/>
-          <a:p>
-            <a:r>
-              <a:rPr lang="en-GB" dirty="0" smtClean="0"/>
-              <a:t>Data:</a:t>
+          <a:p>
+            <a:r>
+              <a:rPr lang="en-GB" dirty="0"/>
+              <a:t>Method:</a:t>
             </a:r>
           </a:p>
           <a:p>
             <a:pPr lvl="1"/>
             <a:r>
-              <a:rPr lang="en-GB" dirty="0" smtClean="0"/>
-              <a:t>Unweighted average of 21 high income countries (including UK as one country)</a:t>
+              <a:rPr lang="en-GB" dirty="0"/>
+              <a:t>Scatterplot</a:t>
             </a:r>
           </a:p>
           <a:p>
             <a:pPr lvl="1"/>
             <a:r>
-              <a:rPr lang="en-GB" dirty="0" smtClean="0"/>
-              <a:t>From 1955 to 1996</a:t>
+              <a:rPr lang="en-GB" dirty="0"/>
+              <a:t>Linear regression line of best fit</a:t>
             </a:r>
           </a:p>
           <a:p>
             <a:pPr lvl="1"/>
             <a:r>
-              <a:rPr lang="en-GB" b="1" dirty="0" smtClean="0"/>
-              <a:t>Source</a:t>
-            </a:r>
-            <a:r>
-              <a:rPr lang="en-GB" dirty="0" smtClean="0"/>
-              <a:t>: Human Mortality Database</a:t>
-            </a:r>
-            <a:endParaRPr lang="en-GB" dirty="0" smtClean="0"/>
-          </a:p>
-          <a:p>
-            <a:pPr lvl="1"/>
-            <a:endParaRPr lang="en-GB" dirty="0" smtClean="0"/>
-          </a:p>
-          <a:p>
-            <a:r>
-              <a:rPr lang="en-GB" dirty="0" smtClean="0"/>
-              <a:t>Method:</a:t>
-            </a:r>
-          </a:p>
-          <a:p>
-            <a:pPr lvl="1"/>
-            <a:r>
-              <a:rPr lang="en-GB" dirty="0" smtClean="0"/>
-              <a:t>Scatterplot</a:t>
-            </a:r>
-          </a:p>
-          <a:p>
-            <a:pPr lvl="1"/>
-            <a:r>
-              <a:rPr lang="en-GB" dirty="0" smtClean="0"/>
-              <a:t>Linear regression line of best fit</a:t>
-            </a:r>
-          </a:p>
-          <a:p>
-            <a:pPr lvl="1"/>
-            <a:r>
-              <a:rPr lang="en-GB" dirty="0" smtClean="0"/>
+              <a:rPr lang="en-GB" dirty="0"/>
               <a:t>R</a:t>
             </a:r>
             <a:r>
-              <a:rPr lang="en-GB" baseline="30000" dirty="0" smtClean="0"/>
+              <a:rPr lang="en-GB" baseline="30000" dirty="0"/>
               <a:t>2 </a:t>
             </a:r>
             <a:r>
-              <a:rPr lang="en-GB" dirty="0" smtClean="0"/>
+              <a:rPr lang="en-GB" dirty="0"/>
               <a:t>value</a:t>
             </a:r>
-            <a:endParaRPr lang="en-GB" dirty="0"/>
           </a:p>
         </p:txBody>
       </p:sp>
@@ -7715,13 +8355,6 @@
   <p:clrMapOvr>
     <a:masterClrMapping/>
   </p:clrMapOvr>
-  <p:timing>
-    <p:tnLst>
-      <p:par>
-        <p:cTn id="1" dur="indefinite" restart="never" nodeType="tmRoot"/>
-      </p:par>
-    </p:tnLst>
-  </p:timing>
 </p:sld>
 </file>
 
@@ -7758,32 +8391,47 @@
           <a:lstStyle/>
           <a:p>
             <a:r>
-              <a:rPr lang="en-GB" dirty="0" smtClean="0"/>
+              <a:rPr lang="en-GB" dirty="0"/>
               <a:t>First claim: Replication</a:t>
             </a:r>
-            <a:endParaRPr lang="en-GB" dirty="0"/>
-          </a:p>
-        </p:txBody>
-      </p:sp>
-      <p:sp>
-        <p:nvSpPr>
-          <p:cNvPr id="3" name="Content Placeholder 2"/>
-          <p:cNvSpPr>
-            <a:spLocks noGrp="1"/>
-          </p:cNvSpPr>
+          </a:p>
+        </p:txBody>
+      </p:sp>
+      <p:pic>
+        <p:nvPicPr>
+          <p:cNvPr id="5" name="Content Placeholder 4">
+            <a:extLst>
+              <a:ext uri="{FF2B5EF4-FFF2-40B4-BE49-F238E27FC236}">
+                <a16:creationId xmlns:a16="http://schemas.microsoft.com/office/drawing/2014/main" id="{2C2AFDC3-886D-46D5-881C-C4D64B9DB4A5}"/>
+              </a:ext>
+            </a:extLst>
+          </p:cNvPr>
+          <p:cNvPicPr>
+            <a:picLocks noGrp="1" noChangeAspect="1"/>
+          </p:cNvPicPr>
           <p:nvPr>
             <p:ph idx="1"/>
           </p:nvPr>
-        </p:nvSpPr>
-        <p:spPr/>
-        <p:txBody>
-          <a:bodyPr/>
-          <a:lstStyle/>
-          <a:p>
-            <a:endParaRPr lang="en-GB"/>
-          </a:p>
-        </p:txBody>
-      </p:sp>
+        </p:nvPicPr>
+        <p:blipFill>
+          <a:blip r:embed="rId2" cstate="print">
+            <a:extLst>
+              <a:ext uri="{28A0092B-C50C-407E-A947-70E740481C1C}">
+                <a14:useLocalDpi xmlns:a14="http://schemas.microsoft.com/office/drawing/2010/main" val="0"/>
+              </a:ext>
+            </a:extLst>
+          </a:blip>
+          <a:stretch>
+            <a:fillRect/>
+          </a:stretch>
+        </p:blipFill>
+        <p:spPr>
+          <a:xfrm>
+            <a:off x="2708063" y="1731963"/>
+            <a:ext cx="6766349" cy="4059237"/>
+          </a:xfrm>
+        </p:spPr>
+      </p:pic>
     </p:spTree>
     <p:extLst>
       <p:ext uri="{BB962C8B-B14F-4D97-AF65-F5344CB8AC3E}">
@@ -7794,13 +8442,6 @@
   <p:clrMapOvr>
     <a:masterClrMapping/>
   </p:clrMapOvr>
-  <p:timing>
-    <p:tnLst>
-      <p:par>
-        <p:cTn id="1" dur="indefinite" restart="never" nodeType="tmRoot"/>
-      </p:par>
-    </p:tnLst>
-  </p:timing>
 </p:sld>
 </file>
 
@@ -7837,32 +8478,47 @@
           <a:lstStyle/>
           <a:p>
             <a:r>
-              <a:rPr lang="en-GB" dirty="0" smtClean="0"/>
+              <a:rPr lang="en-GB" dirty="0"/>
               <a:t>First claim: Updating</a:t>
             </a:r>
-            <a:endParaRPr lang="en-GB" dirty="0"/>
-          </a:p>
-        </p:txBody>
-      </p:sp>
-      <p:sp>
-        <p:nvSpPr>
-          <p:cNvPr id="3" name="Content Placeholder 2"/>
-          <p:cNvSpPr>
-            <a:spLocks noGrp="1"/>
-          </p:cNvSpPr>
+          </a:p>
+        </p:txBody>
+      </p:sp>
+      <p:pic>
+        <p:nvPicPr>
+          <p:cNvPr id="5" name="Content Placeholder 4">
+            <a:extLst>
+              <a:ext uri="{FF2B5EF4-FFF2-40B4-BE49-F238E27FC236}">
+                <a16:creationId xmlns:a16="http://schemas.microsoft.com/office/drawing/2014/main" id="{32B1F12E-6F5F-437E-9096-6252A9FC86A0}"/>
+              </a:ext>
+            </a:extLst>
+          </p:cNvPr>
+          <p:cNvPicPr>
+            <a:picLocks noGrp="1" noChangeAspect="1"/>
+          </p:cNvPicPr>
           <p:nvPr>
             <p:ph idx="1"/>
           </p:nvPr>
-        </p:nvSpPr>
-        <p:spPr/>
-        <p:txBody>
-          <a:bodyPr/>
-          <a:lstStyle/>
-          <a:p>
-            <a:endParaRPr lang="en-GB"/>
-          </a:p>
-        </p:txBody>
-      </p:sp>
+        </p:nvPicPr>
+        <p:blipFill>
+          <a:blip r:embed="rId2" cstate="print">
+            <a:extLst>
+              <a:ext uri="{28A0092B-C50C-407E-A947-70E740481C1C}">
+                <a14:useLocalDpi xmlns:a14="http://schemas.microsoft.com/office/drawing/2010/main" val="0"/>
+              </a:ext>
+            </a:extLst>
+          </a:blip>
+          <a:stretch>
+            <a:fillRect/>
+          </a:stretch>
+        </p:blipFill>
+        <p:spPr>
+          <a:xfrm>
+            <a:off x="2708063" y="1731963"/>
+            <a:ext cx="6766349" cy="4059237"/>
+          </a:xfrm>
+        </p:spPr>
+      </p:pic>
     </p:spTree>
     <p:extLst>
       <p:ext uri="{BB962C8B-B14F-4D97-AF65-F5344CB8AC3E}">
@@ -7873,13 +8529,6 @@
   <p:clrMapOvr>
     <a:masterClrMapping/>
   </p:clrMapOvr>
-  <p:timing>
-    <p:tnLst>
-      <p:par>
-        <p:cTn id="1" dur="indefinite" restart="never" nodeType="tmRoot"/>
-      </p:par>
-    </p:tnLst>
-  </p:timing>
 </p:sld>
 </file>
 

</xml_diff>